<commit_message>
📝 PPT 05 수정
</commit_message>
<xml_diff>
--- a/PPT/05.자바스크립트 - 클라이언트 사이드(Event, DOM, Ajax, Web APIs).pptx
+++ b/PPT/05.자바스크립트 - 클라이언트 사이드(Event, DOM, Ajax, Web APIs).pptx
@@ -8933,7 +8933,7 @@
         </p:nvGraphicFramePr>
         <p:xfrm>
           <a:off x="533400" y="1700213"/>
-          <a:ext cx="4953000" cy="1514872"/>
+          <a:ext cx="4953000" cy="1495822"/>
         </p:xfrm>
         <a:graphic>
           <a:graphicData uri="http://schemas.openxmlformats.org/drawingml/2006/table">
@@ -13449,14 +13449,14 @@
               <a:defRPr/>
             </a:pPr>
             <a:r>
-              <a:rPr lang="en-US" altLang="ko-KR" sz="2000">
+              <a:rPr lang="en-US" altLang="ko-KR" sz="2000" dirty="0">
                 <a:latin typeface="Noto Sans CJK KR Regular" panose="020B0500000000000000" pitchFamily="34" charset="-127"/>
                 <a:ea typeface="Noto Sans CJK KR Regular" panose="020B0500000000000000" pitchFamily="34" charset="-127"/>
               </a:rPr>
               <a:t> </a:t>
             </a:r>
             <a:r>
-              <a:rPr lang="en-US" altLang="ko-KR" sz="2000">
+              <a:rPr lang="en-US" altLang="ko-KR" sz="2000" dirty="0" err="1">
                 <a:solidFill>
                   <a:srgbClr val="FF9E1B"/>
                 </a:solidFill>
@@ -13465,6 +13465,13 @@
               </a:rPr>
               <a:t>elem.innerHTML</a:t>
             </a:r>
+            <a:endParaRPr lang="en-US" altLang="ko-KR" sz="2000" dirty="0">
+              <a:solidFill>
+                <a:srgbClr val="FF9E1B"/>
+              </a:solidFill>
+              <a:latin typeface="Noto Sans CJK KR Regular" panose="020B0500000000000000" pitchFamily="34" charset="-127"/>
+              <a:ea typeface="Noto Sans CJK KR Regular" panose="020B0500000000000000" pitchFamily="34" charset="-127"/>
+            </a:endParaRPr>
           </a:p>
           <a:p>
             <a:pPr lvl="1">
@@ -13473,41 +13480,41 @@
               <a:defRPr/>
             </a:pPr>
             <a:r>
-              <a:rPr lang="ko-KR" altLang="en-US">
+              <a:rPr lang="ko-KR" altLang="en-US" dirty="0">
                 <a:latin typeface="Noto Sans CJK KR Regular" panose="020B0500000000000000" pitchFamily="34" charset="-127"/>
                 <a:ea typeface="Noto Sans CJK KR Regular" panose="020B0500000000000000" pitchFamily="34" charset="-127"/>
               </a:rPr>
               <a:t> </a:t>
             </a:r>
             <a:r>
-              <a:rPr lang="en-US" altLang="ko-KR" b="0">
+              <a:rPr lang="en-US" altLang="ko-KR" b="0" dirty="0" err="1">
                 <a:latin typeface="Noto Sans CJK KR Regular" panose="020B0500000000000000" pitchFamily="34" charset="-127"/>
                 <a:ea typeface="Noto Sans CJK KR Regular" panose="020B0500000000000000" pitchFamily="34" charset="-127"/>
               </a:rPr>
               <a:t>elem</a:t>
             </a:r>
             <a:r>
-              <a:rPr lang="ko-KR" altLang="en-US" b="0">
+              <a:rPr lang="ko-KR" altLang="en-US" b="0" dirty="0">
                 <a:latin typeface="Noto Sans CJK KR Regular" panose="020B0500000000000000" pitchFamily="34" charset="-127"/>
                 <a:ea typeface="Noto Sans CJK KR Regular" panose="020B0500000000000000" pitchFamily="34" charset="-127"/>
               </a:rPr>
               <a:t>의 내부 </a:t>
             </a:r>
             <a:r>
-              <a:rPr lang="en-US" altLang="ko-KR" b="0">
+              <a:rPr lang="en-US" altLang="ko-KR" b="0" dirty="0">
                 <a:latin typeface="Noto Sans CJK KR Regular" panose="020B0500000000000000" pitchFamily="34" charset="-127"/>
                 <a:ea typeface="Noto Sans CJK KR Regular" panose="020B0500000000000000" pitchFamily="34" charset="-127"/>
               </a:rPr>
               <a:t>HTML </a:t>
             </a:r>
             <a:r>
-              <a:rPr lang="ko-KR" altLang="en-US" b="0">
+              <a:rPr lang="ko-KR" altLang="en-US" b="0" dirty="0">
                 <a:latin typeface="Noto Sans CJK KR Regular" panose="020B0500000000000000" pitchFamily="34" charset="-127"/>
                 <a:ea typeface="Noto Sans CJK KR Regular" panose="020B0500000000000000" pitchFamily="34" charset="-127"/>
               </a:rPr>
               <a:t>코드의 값을 조회하거나 수정</a:t>
             </a:r>
-            <a:endParaRPr lang="en-US" altLang="ko-KR" b="0">
+            <a:endParaRPr lang="en-US" altLang="ko-KR" b="0" dirty="0">
               <a:latin typeface="Noto Sans CJK KR Regular" panose="020B0500000000000000" pitchFamily="34" charset="-127"/>
               <a:ea typeface="Noto Sans CJK KR Regular" panose="020B0500000000000000" pitchFamily="34" charset="-127"/>
             </a:endParaRPr>
@@ -13519,20 +13526,34 @@
               <a:defRPr/>
             </a:pPr>
             <a:r>
-              <a:rPr lang="en-US" altLang="ko-KR">
-                <a:latin typeface="Noto Sans CJK KR Regular" panose="020B0500000000000000" pitchFamily="34" charset="-127"/>
-                <a:ea typeface="Noto Sans CJK KR Regular" panose="020B0500000000000000" pitchFamily="34" charset="-127"/>
-              </a:rPr>
-              <a:t> elem </a:t>
-            </a:r>
-            <a:r>
-              <a:rPr lang="ko-KR" altLang="en-US">
+              <a:rPr lang="en-US" altLang="ko-KR" dirty="0">
+                <a:latin typeface="Noto Sans CJK KR Regular" panose="020B0500000000000000" pitchFamily="34" charset="-127"/>
+                <a:ea typeface="Noto Sans CJK KR Regular" panose="020B0500000000000000" pitchFamily="34" charset="-127"/>
+              </a:rPr>
+              <a:t> </a:t>
+            </a:r>
+            <a:r>
+              <a:rPr lang="en-US" altLang="ko-KR" dirty="0" err="1">
+                <a:latin typeface="Noto Sans CJK KR Regular" panose="020B0500000000000000" pitchFamily="34" charset="-127"/>
+                <a:ea typeface="Noto Sans CJK KR Regular" panose="020B0500000000000000" pitchFamily="34" charset="-127"/>
+              </a:rPr>
+              <a:t>elem</a:t>
+            </a:r>
+            <a:r>
+              <a:rPr lang="en-US" altLang="ko-KR" dirty="0">
+                <a:latin typeface="Noto Sans CJK KR Regular" panose="020B0500000000000000" pitchFamily="34" charset="-127"/>
+                <a:ea typeface="Noto Sans CJK KR Regular" panose="020B0500000000000000" pitchFamily="34" charset="-127"/>
+              </a:rPr>
+              <a:t> </a:t>
+            </a:r>
+            <a:r>
+              <a:rPr lang="ko-KR" altLang="en-US" dirty="0">
                 <a:latin typeface="Noto Sans CJK KR Regular" panose="020B0500000000000000" pitchFamily="34" charset="-127"/>
                 <a:ea typeface="Noto Sans CJK KR Regular" panose="020B0500000000000000" pitchFamily="34" charset="-127"/>
               </a:rPr>
               <a:t>자신은 제외</a:t>
             </a:r>
-            <a:endParaRPr lang="en-US" altLang="ko-KR">
+            <a:endParaRPr lang="en-US" altLang="ko-KR" dirty="0">
               <a:latin typeface="Noto Sans CJK KR Regular" panose="020B0500000000000000" pitchFamily="34" charset="-127"/>
               <a:ea typeface="Noto Sans CJK KR Regular" panose="020B0500000000000000" pitchFamily="34" charset="-127"/>
             </a:endParaRPr>
@@ -13543,7 +13564,7 @@
               <a:buChar char="•"/>
               <a:defRPr/>
             </a:pPr>
-            <a:endParaRPr lang="en-US" altLang="ko-KR" b="0">
+            <a:endParaRPr lang="en-US" altLang="ko-KR" b="0" dirty="0">
               <a:latin typeface="Noto Sans CJK KR Regular" panose="020B0500000000000000" pitchFamily="34" charset="-127"/>
               <a:ea typeface="Noto Sans CJK KR Regular" panose="020B0500000000000000" pitchFamily="34" charset="-127"/>
             </a:endParaRPr>
@@ -13554,7 +13575,7 @@
               <a:buChar char="•"/>
               <a:defRPr/>
             </a:pPr>
-            <a:endParaRPr lang="en-US" altLang="ko-KR">
+            <a:endParaRPr lang="en-US" altLang="ko-KR" dirty="0">
               <a:latin typeface="Noto Sans CJK KR Regular" panose="020B0500000000000000" pitchFamily="34" charset="-127"/>
               <a:ea typeface="Noto Sans CJK KR Regular" panose="020B0500000000000000" pitchFamily="34" charset="-127"/>
             </a:endParaRPr>
@@ -13565,7 +13586,7 @@
               <a:buChar char="•"/>
               <a:defRPr/>
             </a:pPr>
-            <a:endParaRPr lang="en-US" altLang="ko-KR" b="0">
+            <a:endParaRPr lang="en-US" altLang="ko-KR" b="0" dirty="0">
               <a:latin typeface="Noto Sans CJK KR Regular" panose="020B0500000000000000" pitchFamily="34" charset="-127"/>
               <a:ea typeface="Noto Sans CJK KR Regular" panose="020B0500000000000000" pitchFamily="34" charset="-127"/>
             </a:endParaRPr>
@@ -13576,7 +13597,7 @@
               <a:buChar char="•"/>
               <a:defRPr/>
             </a:pPr>
-            <a:endParaRPr lang="en-US" altLang="ko-KR">
+            <a:endParaRPr lang="en-US" altLang="ko-KR" dirty="0">
               <a:latin typeface="Noto Sans CJK KR Regular" panose="020B0500000000000000" pitchFamily="34" charset="-127"/>
               <a:ea typeface="Noto Sans CJK KR Regular" panose="020B0500000000000000" pitchFamily="34" charset="-127"/>
             </a:endParaRPr>
@@ -13587,7 +13608,7 @@
               <a:buChar char="•"/>
               <a:defRPr/>
             </a:pPr>
-            <a:endParaRPr lang="en-US" altLang="ko-KR">
+            <a:endParaRPr lang="en-US" altLang="ko-KR" dirty="0">
               <a:latin typeface="Noto Sans CJK KR Regular" panose="020B0500000000000000" pitchFamily="34" charset="-127"/>
               <a:ea typeface="Noto Sans CJK KR Regular" panose="020B0500000000000000" pitchFamily="34" charset="-127"/>
             </a:endParaRPr>
@@ -13598,7 +13619,7 @@
               <a:buChar char="•"/>
               <a:defRPr/>
             </a:pPr>
-            <a:endParaRPr lang="en-US" altLang="ko-KR">
+            <a:endParaRPr lang="en-US" altLang="ko-KR" dirty="0">
               <a:latin typeface="Noto Sans CJK KR Regular" panose="020B0500000000000000" pitchFamily="34" charset="-127"/>
               <a:ea typeface="Noto Sans CJK KR Regular" panose="020B0500000000000000" pitchFamily="34" charset="-127"/>
             </a:endParaRPr>
@@ -13607,7 +13628,7 @@
             <a:pPr>
               <a:defRPr/>
             </a:pPr>
-            <a:endParaRPr lang="en-US" altLang="ko-KR" sz="2000">
+            <a:endParaRPr lang="en-US" altLang="ko-KR" sz="2000" dirty="0">
               <a:latin typeface="Noto Sans CJK KR Regular" panose="020B0500000000000000" pitchFamily="34" charset="-127"/>
               <a:ea typeface="Noto Sans CJK KR Regular" panose="020B0500000000000000" pitchFamily="34" charset="-127"/>
             </a:endParaRPr>
@@ -13619,12 +13640,23 @@
               <a:defRPr/>
             </a:pPr>
             <a:r>
-              <a:rPr lang="en-US" altLang="ko-KR" sz="2000">
-                <a:latin typeface="Noto Sans CJK KR Regular" panose="020B0500000000000000" pitchFamily="34" charset="-127"/>
-                <a:ea typeface="Noto Sans CJK KR Regular" panose="020B0500000000000000" pitchFamily="34" charset="-127"/>
-              </a:rPr>
-              <a:t> elem.outerHTML</a:t>
-            </a:r>
+              <a:rPr lang="en-US" altLang="ko-KR" sz="2000" dirty="0">
+                <a:latin typeface="Noto Sans CJK KR Regular" panose="020B0500000000000000" pitchFamily="34" charset="-127"/>
+                <a:ea typeface="Noto Sans CJK KR Regular" panose="020B0500000000000000" pitchFamily="34" charset="-127"/>
+              </a:rPr>
+              <a:t> </a:t>
+            </a:r>
+            <a:r>
+              <a:rPr lang="en-US" altLang="ko-KR" sz="2000" dirty="0" err="1">
+                <a:latin typeface="Noto Sans CJK KR Regular" panose="020B0500000000000000" pitchFamily="34" charset="-127"/>
+                <a:ea typeface="Noto Sans CJK KR Regular" panose="020B0500000000000000" pitchFamily="34" charset="-127"/>
+              </a:rPr>
+              <a:t>elem.outerHTML</a:t>
+            </a:r>
+            <a:endParaRPr lang="en-US" altLang="ko-KR" sz="2000" dirty="0">
+              <a:latin typeface="Noto Sans CJK KR Regular" panose="020B0500000000000000" pitchFamily="34" charset="-127"/>
+              <a:ea typeface="Noto Sans CJK KR Regular" panose="020B0500000000000000" pitchFamily="34" charset="-127"/>
+            </a:endParaRPr>
           </a:p>
           <a:p>
             <a:pPr lvl="1">
@@ -13633,55 +13665,55 @@
               <a:defRPr/>
             </a:pPr>
             <a:r>
-              <a:rPr lang="ko-KR" altLang="en-US">
+              <a:rPr lang="ko-KR" altLang="en-US" dirty="0">
                 <a:latin typeface="Noto Sans CJK KR Regular" panose="020B0500000000000000" pitchFamily="34" charset="-127"/>
                 <a:ea typeface="Noto Sans CJK KR Regular" panose="020B0500000000000000" pitchFamily="34" charset="-127"/>
               </a:rPr>
               <a:t> </a:t>
             </a:r>
             <a:r>
-              <a:rPr lang="en-US" altLang="ko-KR" b="0">
+              <a:rPr lang="en-US" altLang="ko-KR" b="0" dirty="0" err="1">
                 <a:latin typeface="Noto Sans CJK KR Regular" panose="020B0500000000000000" pitchFamily="34" charset="-127"/>
                 <a:ea typeface="Noto Sans CJK KR Regular" panose="020B0500000000000000" pitchFamily="34" charset="-127"/>
               </a:rPr>
               <a:t>elem</a:t>
             </a:r>
             <a:r>
-              <a:rPr lang="ko-KR" altLang="en-US" b="0">
+              <a:rPr lang="ko-KR" altLang="en-US" b="0" dirty="0">
                 <a:latin typeface="Noto Sans CJK KR Regular" panose="020B0500000000000000" pitchFamily="34" charset="-127"/>
                 <a:ea typeface="Noto Sans CJK KR Regular" panose="020B0500000000000000" pitchFamily="34" charset="-127"/>
               </a:rPr>
               <a:t>의 내부 </a:t>
             </a:r>
             <a:r>
-              <a:rPr lang="en-US" altLang="ko-KR" b="0">
+              <a:rPr lang="en-US" altLang="ko-KR" b="0" dirty="0">
                 <a:latin typeface="Noto Sans CJK KR Regular" panose="020B0500000000000000" pitchFamily="34" charset="-127"/>
                 <a:ea typeface="Noto Sans CJK KR Regular" panose="020B0500000000000000" pitchFamily="34" charset="-127"/>
               </a:rPr>
               <a:t>HTML </a:t>
             </a:r>
             <a:r>
-              <a:rPr lang="ko-KR" altLang="en-US" b="0">
+              <a:rPr lang="ko-KR" altLang="en-US" b="0" dirty="0">
                 <a:latin typeface="Noto Sans CJK KR Regular" panose="020B0500000000000000" pitchFamily="34" charset="-127"/>
                 <a:ea typeface="Noto Sans CJK KR Regular" panose="020B0500000000000000" pitchFamily="34" charset="-127"/>
               </a:rPr>
               <a:t>코드의 값을 </a:t>
             </a:r>
             <a:r>
-              <a:rPr lang="ko-KR" altLang="en-US">
+              <a:rPr lang="ko-KR" altLang="en-US" dirty="0">
                 <a:latin typeface="Noto Sans CJK KR Regular" panose="020B0500000000000000" pitchFamily="34" charset="-127"/>
                 <a:ea typeface="Noto Sans CJK KR Regular" panose="020B0500000000000000" pitchFamily="34" charset="-127"/>
               </a:rPr>
               <a:t>조회하거나</a:t>
             </a:r>
             <a:r>
-              <a:rPr lang="ko-KR" altLang="en-US" b="0">
+              <a:rPr lang="ko-KR" altLang="en-US" b="0" dirty="0">
                 <a:latin typeface="Noto Sans CJK KR Regular" panose="020B0500000000000000" pitchFamily="34" charset="-127"/>
                 <a:ea typeface="Noto Sans CJK KR Regular" panose="020B0500000000000000" pitchFamily="34" charset="-127"/>
               </a:rPr>
               <a:t> 수정</a:t>
             </a:r>
-            <a:endParaRPr lang="en-US" altLang="ko-KR" b="0">
+            <a:endParaRPr lang="en-US" altLang="ko-KR" b="0" dirty="0">
               <a:latin typeface="Noto Sans CJK KR Regular" panose="020B0500000000000000" pitchFamily="34" charset="-127"/>
               <a:ea typeface="Noto Sans CJK KR Regular" panose="020B0500000000000000" pitchFamily="34" charset="-127"/>
             </a:endParaRPr>
@@ -13693,20 +13725,34 @@
               <a:defRPr/>
             </a:pPr>
             <a:r>
-              <a:rPr lang="en-US" altLang="ko-KR">
-                <a:latin typeface="Noto Sans CJK KR Regular" panose="020B0500000000000000" pitchFamily="34" charset="-127"/>
-                <a:ea typeface="Noto Sans CJK KR Regular" panose="020B0500000000000000" pitchFamily="34" charset="-127"/>
-              </a:rPr>
-              <a:t> elem </a:t>
-            </a:r>
-            <a:r>
-              <a:rPr lang="ko-KR" altLang="en-US">
+              <a:rPr lang="en-US" altLang="ko-KR" dirty="0">
+                <a:latin typeface="Noto Sans CJK KR Regular" panose="020B0500000000000000" pitchFamily="34" charset="-127"/>
+                <a:ea typeface="Noto Sans CJK KR Regular" panose="020B0500000000000000" pitchFamily="34" charset="-127"/>
+              </a:rPr>
+              <a:t> </a:t>
+            </a:r>
+            <a:r>
+              <a:rPr lang="en-US" altLang="ko-KR" dirty="0" err="1">
+                <a:latin typeface="Noto Sans CJK KR Regular" panose="020B0500000000000000" pitchFamily="34" charset="-127"/>
+                <a:ea typeface="Noto Sans CJK KR Regular" panose="020B0500000000000000" pitchFamily="34" charset="-127"/>
+              </a:rPr>
+              <a:t>elem</a:t>
+            </a:r>
+            <a:r>
+              <a:rPr lang="en-US" altLang="ko-KR" dirty="0">
+                <a:latin typeface="Noto Sans CJK KR Regular" panose="020B0500000000000000" pitchFamily="34" charset="-127"/>
+                <a:ea typeface="Noto Sans CJK KR Regular" panose="020B0500000000000000" pitchFamily="34" charset="-127"/>
+              </a:rPr>
+              <a:t> </a:t>
+            </a:r>
+            <a:r>
+              <a:rPr lang="ko-KR" altLang="en-US" dirty="0">
                 <a:latin typeface="Noto Sans CJK KR Regular" panose="020B0500000000000000" pitchFamily="34" charset="-127"/>
                 <a:ea typeface="Noto Sans CJK KR Regular" panose="020B0500000000000000" pitchFamily="34" charset="-127"/>
               </a:rPr>
               <a:t>자신을 포함</a:t>
             </a:r>
-            <a:endParaRPr lang="en-US" altLang="ko-KR">
+            <a:endParaRPr lang="en-US" altLang="ko-KR" dirty="0">
               <a:latin typeface="Noto Sans CJK KR Regular" panose="020B0500000000000000" pitchFamily="34" charset="-127"/>
               <a:ea typeface="Noto Sans CJK KR Regular" panose="020B0500000000000000" pitchFamily="34" charset="-127"/>
             </a:endParaRPr>
@@ -13861,7 +13907,7 @@
           <a:lstStyle/>
           <a:p>
             <a:r>
-              <a:rPr lang="en-US" altLang="ko-KR" b="0">
+              <a:rPr lang="en-US" altLang="ko-KR" b="0" dirty="0">
                 <a:solidFill>
                   <a:srgbClr val="3B3B3B"/>
                 </a:solidFill>
@@ -13871,106 +13917,116 @@
               <a:t>  </a:t>
             </a:r>
             <a:r>
-              <a:rPr lang="en-US" altLang="ko-KR" b="0">
+              <a:rPr lang="en-US" altLang="ko-KR" b="0" dirty="0">
                 <a:solidFill>
                   <a:srgbClr val="800000"/>
                 </a:solidFill>
                 <a:effectLst/>
                 <a:latin typeface="Consolas" panose="020B0609020204030204" pitchFamily="49" charset="0"/>
               </a:rPr>
-              <a:t>&lt;ul</a:t>
-            </a:r>
-            <a:r>
-              <a:rPr lang="en-US" altLang="ko-KR" b="0">
-                <a:solidFill>
-                  <a:srgbClr val="3B3B3B"/>
+              <a:t>&lt;</a:t>
+            </a:r>
+            <a:r>
+              <a:rPr lang="en-US" altLang="ko-KR" b="0" dirty="0" err="1">
+                <a:solidFill>
+                  <a:srgbClr val="800000"/>
                 </a:solidFill>
                 <a:effectLst/>
                 <a:latin typeface="Consolas" panose="020B0609020204030204" pitchFamily="49" charset="0"/>
               </a:rPr>
-              <a:t> </a:t>
-            </a:r>
-            <a:r>
-              <a:rPr lang="en-US" altLang="ko-KR" b="0">
-                <a:solidFill>
-                  <a:srgbClr val="E50000"/>
+              <a:t>ul</a:t>
+            </a:r>
+            <a:r>
+              <a:rPr lang="en-US" altLang="ko-KR" b="0" dirty="0">
+                <a:solidFill>
+                  <a:srgbClr val="3B3B3B"/>
                 </a:solidFill>
                 <a:effectLst/>
                 <a:latin typeface="Consolas" panose="020B0609020204030204" pitchFamily="49" charset="0"/>
               </a:rPr>
-              <a:t>id</a:t>
-            </a:r>
-            <a:r>
-              <a:rPr lang="en-US" altLang="ko-KR" b="0">
-                <a:solidFill>
-                  <a:srgbClr val="3B3B3B"/>
+              <a:t> </a:t>
+            </a:r>
+            <a:r>
+              <a:rPr lang="en-US" altLang="ko-KR" b="0" dirty="0">
+                <a:solidFill>
+                  <a:srgbClr val="E50000"/>
                 </a:solidFill>
                 <a:effectLst/>
                 <a:latin typeface="Consolas" panose="020B0609020204030204" pitchFamily="49" charset="0"/>
               </a:rPr>
-              <a:t>=</a:t>
-            </a:r>
-            <a:r>
-              <a:rPr lang="en-US" altLang="ko-KR" b="0">
-                <a:solidFill>
-                  <a:srgbClr val="0000FF"/>
+              <a:t>id</a:t>
+            </a:r>
+            <a:r>
+              <a:rPr lang="en-US" altLang="ko-KR" b="0" dirty="0">
+                <a:solidFill>
+                  <a:srgbClr val="3B3B3B"/>
                 </a:solidFill>
                 <a:effectLst/>
                 <a:latin typeface="Consolas" panose="020B0609020204030204" pitchFamily="49" charset="0"/>
               </a:rPr>
-              <a:t>"purchases"</a:t>
-            </a:r>
-            <a:r>
-              <a:rPr lang="en-US" altLang="ko-KR" b="0">
-                <a:solidFill>
-                  <a:srgbClr val="3B3B3B"/>
+              <a:t>=</a:t>
+            </a:r>
+            <a:r>
+              <a:rPr lang="en-US" altLang="ko-KR" b="0" dirty="0">
+                <a:solidFill>
+                  <a:srgbClr val="0000FF"/>
                 </a:solidFill>
                 <a:effectLst/>
                 <a:latin typeface="Consolas" panose="020B0609020204030204" pitchFamily="49" charset="0"/>
               </a:rPr>
-              <a:t> </a:t>
-            </a:r>
-            <a:r>
-              <a:rPr lang="en-US" altLang="ko-KR" b="0">
-                <a:solidFill>
-                  <a:srgbClr val="E50000"/>
+              <a:t>"purchases"</a:t>
+            </a:r>
+            <a:r>
+              <a:rPr lang="en-US" altLang="ko-KR" b="0" dirty="0">
+                <a:solidFill>
+                  <a:srgbClr val="3B3B3B"/>
                 </a:solidFill>
                 <a:effectLst/>
                 <a:latin typeface="Consolas" panose="020B0609020204030204" pitchFamily="49" charset="0"/>
               </a:rPr>
-              <a:t>class</a:t>
-            </a:r>
-            <a:r>
-              <a:rPr lang="en-US" altLang="ko-KR" b="0">
-                <a:solidFill>
-                  <a:srgbClr val="3B3B3B"/>
+              <a:t> </a:t>
+            </a:r>
+            <a:r>
+              <a:rPr lang="en-US" altLang="ko-KR" b="0" dirty="0">
+                <a:solidFill>
+                  <a:srgbClr val="E50000"/>
                 </a:solidFill>
                 <a:effectLst/>
                 <a:latin typeface="Consolas" panose="020B0609020204030204" pitchFamily="49" charset="0"/>
               </a:rPr>
-              <a:t>=</a:t>
-            </a:r>
-            <a:r>
-              <a:rPr lang="en-US" altLang="ko-KR" b="0">
-                <a:solidFill>
-                  <a:srgbClr val="0000FF"/>
+              <a:t>class</a:t>
+            </a:r>
+            <a:r>
+              <a:rPr lang="en-US" altLang="ko-KR" b="0" dirty="0">
+                <a:solidFill>
+                  <a:srgbClr val="3B3B3B"/>
                 </a:solidFill>
                 <a:effectLst/>
                 <a:latin typeface="Consolas" panose="020B0609020204030204" pitchFamily="49" charset="0"/>
               </a:rPr>
-              <a:t>"list"</a:t>
-            </a:r>
-            <a:r>
-              <a:rPr lang="en-US" altLang="ko-KR" b="0">
-                <a:solidFill>
-                  <a:srgbClr val="800000"/>
+              <a:t>=</a:t>
+            </a:r>
+            <a:r>
+              <a:rPr lang="en-US" altLang="ko-KR" b="0" dirty="0">
+                <a:solidFill>
+                  <a:srgbClr val="0000FF"/>
                 </a:solidFill>
                 <a:effectLst/>
                 <a:latin typeface="Consolas" panose="020B0609020204030204" pitchFamily="49" charset="0"/>
               </a:rPr>
+              <a:t>"list"</a:t>
+            </a:r>
+            <a:r>
+              <a:rPr lang="en-US" altLang="ko-KR" b="0" dirty="0">
+                <a:solidFill>
+                  <a:srgbClr val="800000"/>
+                </a:solidFill>
+                <a:effectLst/>
+                <a:latin typeface="Consolas" panose="020B0609020204030204" pitchFamily="49" charset="0"/>
+              </a:rPr>
               <a:t>&gt;</a:t>
             </a:r>
-            <a:endParaRPr lang="en-US" altLang="ko-KR" b="0">
+            <a:endParaRPr lang="en-US" altLang="ko-KR" b="0" dirty="0">
               <a:solidFill>
                 <a:srgbClr val="3B3B3B"/>
               </a:solidFill>
@@ -13980,7 +14036,7 @@
           </a:p>
           <a:p>
             <a:r>
-              <a:rPr lang="en-US" altLang="ko-KR" b="0">
+              <a:rPr lang="en-US" altLang="ko-KR" b="0" dirty="0">
                 <a:solidFill>
                   <a:srgbClr val="3B3B3B"/>
                 </a:solidFill>
@@ -13990,7 +14046,7 @@
               <a:t>    </a:t>
             </a:r>
             <a:r>
-              <a:rPr lang="en-US" altLang="ko-KR" b="0">
+              <a:rPr lang="en-US" altLang="ko-KR" b="0" dirty="0">
                 <a:solidFill>
                   <a:srgbClr val="800000"/>
                 </a:solidFill>
@@ -14000,7 +14056,7 @@
               <a:t>&lt;li&gt;</a:t>
             </a:r>
             <a:r>
-              <a:rPr lang="ko-KR" altLang="en-US" b="0">
+              <a:rPr lang="ko-KR" altLang="en-US" b="0" dirty="0">
                 <a:solidFill>
                   <a:srgbClr val="3B3B3B"/>
                 </a:solidFill>
@@ -14010,7 +14066,7 @@
               <a:t>두부</a:t>
             </a:r>
             <a:r>
-              <a:rPr lang="en-US" altLang="ko-KR" b="0">
+              <a:rPr lang="en-US" altLang="ko-KR" b="0" dirty="0">
                 <a:solidFill>
                   <a:srgbClr val="800000"/>
                 </a:solidFill>
@@ -14019,7 +14075,7 @@
               </a:rPr>
               <a:t>&lt;/li&gt;</a:t>
             </a:r>
-            <a:endParaRPr lang="en-US" altLang="ko-KR" b="0">
+            <a:endParaRPr lang="en-US" altLang="ko-KR" b="0" dirty="0">
               <a:solidFill>
                 <a:srgbClr val="3B3B3B"/>
               </a:solidFill>
@@ -14029,7 +14085,7 @@
           </a:p>
           <a:p>
             <a:r>
-              <a:rPr lang="en-US" altLang="ko-KR" b="0">
+              <a:rPr lang="en-US" altLang="ko-KR" b="0" dirty="0">
                 <a:solidFill>
                   <a:srgbClr val="3B3B3B"/>
                 </a:solidFill>
@@ -14039,7 +14095,7 @@
               <a:t>    </a:t>
             </a:r>
             <a:r>
-              <a:rPr lang="en-US" altLang="ko-KR" b="0">
+              <a:rPr lang="en-US" altLang="ko-KR" b="0" dirty="0">
                 <a:solidFill>
                   <a:srgbClr val="800000"/>
                 </a:solidFill>
@@ -14049,7 +14105,7 @@
               <a:t>&lt;li&gt;</a:t>
             </a:r>
             <a:r>
-              <a:rPr lang="ko-KR" altLang="en-US" b="0">
+              <a:rPr lang="ko-KR" altLang="en-US" b="0" dirty="0">
                 <a:solidFill>
                   <a:srgbClr val="3B3B3B"/>
                 </a:solidFill>
@@ -14059,7 +14115,7 @@
               <a:t>계란</a:t>
             </a:r>
             <a:r>
-              <a:rPr lang="en-US" altLang="ko-KR" b="0">
+              <a:rPr lang="en-US" altLang="ko-KR" b="0" dirty="0">
                 <a:solidFill>
                   <a:srgbClr val="800000"/>
                 </a:solidFill>
@@ -14068,7 +14124,7 @@
               </a:rPr>
               <a:t>&lt;/li&gt;</a:t>
             </a:r>
-            <a:endParaRPr lang="en-US" altLang="ko-KR" b="0">
+            <a:endParaRPr lang="en-US" altLang="ko-KR" b="0" dirty="0">
               <a:solidFill>
                 <a:srgbClr val="3B3B3B"/>
               </a:solidFill>
@@ -14078,7 +14134,7 @@
           </a:p>
           <a:p>
             <a:r>
-              <a:rPr lang="en-US" altLang="ko-KR" b="0">
+              <a:rPr lang="en-US" altLang="ko-KR" b="0" dirty="0">
                 <a:solidFill>
                   <a:srgbClr val="3B3B3B"/>
                 </a:solidFill>
@@ -14088,7 +14144,7 @@
               <a:t>    </a:t>
             </a:r>
             <a:r>
-              <a:rPr lang="en-US" altLang="ko-KR" b="0">
+              <a:rPr lang="en-US" altLang="ko-KR" b="0" dirty="0">
                 <a:solidFill>
                   <a:srgbClr val="800000"/>
                 </a:solidFill>
@@ -14098,7 +14154,7 @@
               <a:t>&lt;li&gt;</a:t>
             </a:r>
             <a:r>
-              <a:rPr lang="ko-KR" altLang="en-US" b="0">
+              <a:rPr lang="ko-KR" altLang="en-US" b="0" dirty="0">
                 <a:solidFill>
                   <a:srgbClr val="3B3B3B"/>
                 </a:solidFill>
@@ -14108,7 +14164,7 @@
               <a:t>라면</a:t>
             </a:r>
             <a:r>
-              <a:rPr lang="en-US" altLang="ko-KR" b="0">
+              <a:rPr lang="en-US" altLang="ko-KR" b="0" dirty="0">
                 <a:solidFill>
                   <a:srgbClr val="800000"/>
                 </a:solidFill>
@@ -14117,7 +14173,7 @@
               </a:rPr>
               <a:t>&lt;/li&gt;</a:t>
             </a:r>
-            <a:endParaRPr lang="en-US" altLang="ko-KR" b="0">
+            <a:endParaRPr lang="en-US" altLang="ko-KR" b="0" dirty="0">
               <a:solidFill>
                 <a:srgbClr val="3B3B3B"/>
               </a:solidFill>
@@ -14127,7 +14183,7 @@
           </a:p>
           <a:p>
             <a:r>
-              <a:rPr lang="en-US" altLang="ko-KR" b="0">
+              <a:rPr lang="en-US" altLang="ko-KR" b="0" dirty="0">
                 <a:solidFill>
                   <a:srgbClr val="3B3B3B"/>
                 </a:solidFill>
@@ -14137,16 +14193,36 @@
               <a:t>  </a:t>
             </a:r>
             <a:r>
-              <a:rPr lang="en-US" altLang="ko-KR" b="0">
+              <a:rPr lang="en-US" altLang="ko-KR" b="0" dirty="0">
                 <a:solidFill>
                   <a:srgbClr val="800000"/>
                 </a:solidFill>
                 <a:effectLst/>
                 <a:latin typeface="Consolas" panose="020B0609020204030204" pitchFamily="49" charset="0"/>
               </a:rPr>
-              <a:t>&lt;/ul&gt;</a:t>
-            </a:r>
-            <a:endParaRPr lang="en-US" altLang="ko-KR" b="0">
+              <a:t>&lt;/</a:t>
+            </a:r>
+            <a:r>
+              <a:rPr lang="en-US" altLang="ko-KR" b="0" dirty="0" err="1">
+                <a:solidFill>
+                  <a:srgbClr val="800000"/>
+                </a:solidFill>
+                <a:effectLst/>
+                <a:latin typeface="Consolas" panose="020B0609020204030204" pitchFamily="49" charset="0"/>
+              </a:rPr>
+              <a:t>ul</a:t>
+            </a:r>
+            <a:r>
+              <a:rPr lang="en-US" altLang="ko-KR" b="0" dirty="0">
+                <a:solidFill>
+                  <a:srgbClr val="800000"/>
+                </a:solidFill>
+                <a:effectLst/>
+                <a:latin typeface="Consolas" panose="020B0609020204030204" pitchFamily="49" charset="0"/>
+              </a:rPr>
+              <a:t>&gt;</a:t>
+            </a:r>
+            <a:endParaRPr lang="en-US" altLang="ko-KR" b="0" dirty="0">
               <a:solidFill>
                 <a:srgbClr val="3B3B3B"/>
               </a:solidFill>
@@ -14190,8 +14266,88 @@
           <a:lstStyle/>
           <a:p>
             <a:r>
-              <a:rPr lang="ko-KR" altLang="en-US"/>
-              <a:t>'\n    &lt;li&gt;두부&lt;/li&gt;\n    &lt;li&gt;계란&lt;/li&gt;\n    &lt;li&gt;라면&lt;/li&gt;\n  '</a:t>
+              <a:rPr lang="ko-KR" altLang="en-US" dirty="0"/>
+              <a:t>'\</a:t>
+            </a:r>
+            <a:r>
+              <a:rPr lang="ko-KR" altLang="en-US" dirty="0" err="1"/>
+              <a:t>n</a:t>
+            </a:r>
+            <a:r>
+              <a:rPr lang="ko-KR" altLang="en-US" dirty="0"/>
+              <a:t>    &lt;</a:t>
+            </a:r>
+            <a:r>
+              <a:rPr lang="ko-KR" altLang="en-US" dirty="0" err="1"/>
+              <a:t>li</a:t>
+            </a:r>
+            <a:r>
+              <a:rPr lang="ko-KR" altLang="en-US" dirty="0"/>
+              <a:t>&gt;두부&lt;/</a:t>
+            </a:r>
+            <a:r>
+              <a:rPr lang="ko-KR" altLang="en-US" dirty="0" err="1"/>
+              <a:t>li</a:t>
+            </a:r>
+            <a:r>
+              <a:rPr lang="ko-KR" altLang="en-US" dirty="0"/>
+              <a:t>&gt;\</a:t>
+            </a:r>
+            <a:r>
+              <a:rPr lang="ko-KR" altLang="en-US" dirty="0" err="1"/>
+              <a:t>n</a:t>
+            </a:r>
+            <a:r>
+              <a:rPr lang="ko-KR" altLang="en-US" dirty="0"/>
+              <a:t>    &lt;</a:t>
+            </a:r>
+            <a:r>
+              <a:rPr lang="ko-KR" altLang="en-US" dirty="0" err="1"/>
+              <a:t>li</a:t>
+            </a:r>
+            <a:r>
+              <a:rPr lang="ko-KR" altLang="en-US" dirty="0"/>
+              <a:t>&gt;계란&lt;/</a:t>
+            </a:r>
+            <a:r>
+              <a:rPr lang="ko-KR" altLang="en-US" dirty="0" err="1"/>
+              <a:t>li</a:t>
+            </a:r>
+            <a:r>
+              <a:rPr lang="ko-KR" altLang="en-US" dirty="0"/>
+              <a:t>&gt;\</a:t>
+            </a:r>
+            <a:r>
+              <a:rPr lang="ko-KR" altLang="en-US" dirty="0" err="1"/>
+              <a:t>n</a:t>
+            </a:r>
+            <a:r>
+              <a:rPr lang="ko-KR" altLang="en-US" dirty="0"/>
+              <a:t>    &lt;</a:t>
+            </a:r>
+            <a:r>
+              <a:rPr lang="ko-KR" altLang="en-US" dirty="0" err="1"/>
+              <a:t>li</a:t>
+            </a:r>
+            <a:r>
+              <a:rPr lang="ko-KR" altLang="en-US" dirty="0"/>
+              <a:t>&gt;라면&lt;/</a:t>
+            </a:r>
+            <a:r>
+              <a:rPr lang="ko-KR" altLang="en-US" dirty="0" err="1"/>
+              <a:t>li</a:t>
+            </a:r>
+            <a:r>
+              <a:rPr lang="ko-KR" altLang="en-US" dirty="0"/>
+              <a:t>&gt;\</a:t>
+            </a:r>
+            <a:r>
+              <a:rPr lang="ko-KR" altLang="en-US" dirty="0" err="1"/>
+              <a:t>n</a:t>
+            </a:r>
+            <a:r>
+              <a:rPr lang="ko-KR" altLang="en-US" dirty="0"/>
+              <a:t>  '</a:t>
             </a:r>
           </a:p>
         </p:txBody>
@@ -14230,8 +14386,136 @@
           <a:lstStyle/>
           <a:p>
             <a:r>
-              <a:rPr lang="ko-KR" altLang="en-US"/>
-              <a:t>'&lt;ul id="purchases" class="list"&gt;\n    &lt;li&gt;두부&lt;/li&gt;\n    &lt;li&gt;계란&lt;/li&gt;\n    &lt;li&gt;라면&lt;/li&gt;\n  &lt;/ul&gt;'</a:t>
+              <a:rPr lang="ko-KR" altLang="en-US" dirty="0"/>
+              <a:t>'&lt;</a:t>
+            </a:r>
+            <a:r>
+              <a:rPr lang="ko-KR" altLang="en-US" dirty="0" err="1"/>
+              <a:t>ul</a:t>
+            </a:r>
+            <a:r>
+              <a:rPr lang="ko-KR" altLang="en-US" dirty="0"/>
+              <a:t> </a:t>
+            </a:r>
+            <a:r>
+              <a:rPr lang="ko-KR" altLang="en-US" dirty="0" err="1"/>
+              <a:t>id</a:t>
+            </a:r>
+            <a:r>
+              <a:rPr lang="ko-KR" altLang="en-US" dirty="0"/>
+              <a:t>="</a:t>
+            </a:r>
+            <a:r>
+              <a:rPr lang="ko-KR" altLang="en-US" dirty="0" err="1"/>
+              <a:t>purchases</a:t>
+            </a:r>
+            <a:r>
+              <a:rPr lang="ko-KR" altLang="en-US" dirty="0"/>
+              <a:t>" </a:t>
+            </a:r>
+            <a:r>
+              <a:rPr lang="ko-KR" altLang="en-US" dirty="0" err="1"/>
+              <a:t>class</a:t>
+            </a:r>
+            <a:r>
+              <a:rPr lang="ko-KR" altLang="en-US" dirty="0"/>
+              <a:t>="</a:t>
+            </a:r>
+            <a:r>
+              <a:rPr lang="ko-KR" altLang="en-US" dirty="0" err="1"/>
+              <a:t>list</a:t>
+            </a:r>
+            <a:r>
+              <a:rPr lang="ko-KR" altLang="en-US" dirty="0"/>
+              <a:t>"&gt;\</a:t>
+            </a:r>
+            <a:r>
+              <a:rPr lang="ko-KR" altLang="en-US" dirty="0" err="1"/>
+              <a:t>n</a:t>
+            </a:r>
+            <a:r>
+              <a:rPr lang="ko-KR" altLang="en-US" dirty="0"/>
+              <a:t>    &lt;</a:t>
+            </a:r>
+            <a:r>
+              <a:rPr lang="ko-KR" altLang="en-US" dirty="0" err="1"/>
+              <a:t>li</a:t>
+            </a:r>
+            <a:r>
+              <a:rPr lang="ko-KR" altLang="en-US" dirty="0"/>
+              <a:t>&gt;두부&lt;/</a:t>
+            </a:r>
+            <a:r>
+              <a:rPr lang="ko-KR" altLang="en-US" dirty="0" err="1"/>
+              <a:t>li</a:t>
+            </a:r>
+            <a:r>
+              <a:rPr lang="ko-KR" altLang="en-US" dirty="0"/>
+              <a:t>&gt;\</a:t>
+            </a:r>
+            <a:r>
+              <a:rPr lang="ko-KR" altLang="en-US" dirty="0" err="1"/>
+              <a:t>n</a:t>
+            </a:r>
+            <a:r>
+              <a:rPr lang="ko-KR" altLang="en-US" dirty="0"/>
+              <a:t>    &lt;</a:t>
+            </a:r>
+            <a:r>
+              <a:rPr lang="ko-KR" altLang="en-US" dirty="0" err="1"/>
+              <a:t>li</a:t>
+            </a:r>
+            <a:r>
+              <a:rPr lang="ko-KR" altLang="en-US" dirty="0"/>
+              <a:t>&gt;계란&lt;/</a:t>
+            </a:r>
+            <a:r>
+              <a:rPr lang="ko-KR" altLang="en-US" dirty="0" err="1"/>
+              <a:t>li</a:t>
+            </a:r>
+            <a:r>
+              <a:rPr lang="ko-KR" altLang="en-US" dirty="0"/>
+              <a:t>&gt;\</a:t>
+            </a:r>
+            <a:r>
+              <a:rPr lang="ko-KR" altLang="en-US" dirty="0" err="1"/>
+              <a:t>n</a:t>
+            </a:r>
+            <a:r>
+              <a:rPr lang="ko-KR" altLang="en-US" dirty="0"/>
+              <a:t>    &lt;</a:t>
+            </a:r>
+            <a:r>
+              <a:rPr lang="ko-KR" altLang="en-US" dirty="0" err="1"/>
+              <a:t>li</a:t>
+            </a:r>
+            <a:r>
+              <a:rPr lang="ko-KR" altLang="en-US" dirty="0"/>
+              <a:t>&gt;라면&lt;/</a:t>
+            </a:r>
+            <a:r>
+              <a:rPr lang="ko-KR" altLang="en-US" dirty="0" err="1"/>
+              <a:t>li</a:t>
+            </a:r>
+            <a:r>
+              <a:rPr lang="ko-KR" altLang="en-US" dirty="0"/>
+              <a:t>&gt;\</a:t>
+            </a:r>
+            <a:r>
+              <a:rPr lang="ko-KR" altLang="en-US" dirty="0" err="1"/>
+              <a:t>n</a:t>
+            </a:r>
+            <a:r>
+              <a:rPr lang="ko-KR" altLang="en-US" dirty="0"/>
+              <a:t>  &lt;/</a:t>
+            </a:r>
+            <a:r>
+              <a:rPr lang="ko-KR" altLang="en-US" dirty="0" err="1"/>
+              <a:t>ul</a:t>
+            </a:r>
+            <a:r>
+              <a:rPr lang="ko-KR" altLang="en-US" dirty="0"/>
+              <a:t>&gt;'</a:t>
             </a:r>
           </a:p>
         </p:txBody>
@@ -14270,7 +14554,7 @@
           <a:lstStyle/>
           <a:p>
             <a:r>
-              <a:rPr lang="en-US" altLang="ko-KR" b="0">
+              <a:rPr lang="en-US" altLang="ko-KR" b="0" dirty="0">
                 <a:solidFill>
                   <a:srgbClr val="0000FF"/>
                 </a:solidFill>
@@ -14280,7 +14564,7 @@
               <a:t>const</a:t>
             </a:r>
             <a:r>
-              <a:rPr lang="en-US" altLang="ko-KR" b="0">
+              <a:rPr lang="en-US" altLang="ko-KR" b="0" dirty="0">
                 <a:solidFill>
                   <a:srgbClr val="3B3B3B"/>
                 </a:solidFill>
@@ -14290,7 +14574,7 @@
               <a:t> </a:t>
             </a:r>
             <a:r>
-              <a:rPr lang="en-US" altLang="ko-KR" b="0">
+              <a:rPr lang="en-US" altLang="ko-KR" b="0" dirty="0" err="1">
                 <a:solidFill>
                   <a:srgbClr val="0070C1"/>
                 </a:solidFill>
@@ -14300,7 +14584,7 @@
               <a:t>shoppingList</a:t>
             </a:r>
             <a:r>
-              <a:rPr lang="en-US" altLang="ko-KR" b="0">
+              <a:rPr lang="en-US" altLang="ko-KR" b="0" dirty="0">
                 <a:solidFill>
                   <a:srgbClr val="3B3B3B"/>
                 </a:solidFill>
@@ -14310,7 +14594,7 @@
               <a:t> </a:t>
             </a:r>
             <a:r>
-              <a:rPr lang="en-US" altLang="ko-KR" b="0">
+              <a:rPr lang="en-US" altLang="ko-KR" b="0" dirty="0">
                 <a:solidFill>
                   <a:srgbClr val="000000"/>
                 </a:solidFill>
@@ -14320,7 +14604,7 @@
               <a:t>=</a:t>
             </a:r>
             <a:r>
-              <a:rPr lang="en-US" altLang="ko-KR" b="0">
+              <a:rPr lang="en-US" altLang="ko-KR" b="0" dirty="0">
                 <a:solidFill>
                   <a:srgbClr val="3B3B3B"/>
                 </a:solidFill>
@@ -14330,7 +14614,7 @@
               <a:t> </a:t>
             </a:r>
             <a:r>
-              <a:rPr lang="en-US" altLang="ko-KR" b="0">
+              <a:rPr lang="en-US" altLang="ko-KR" b="0" dirty="0" err="1">
                 <a:solidFill>
                   <a:srgbClr val="001080"/>
                 </a:solidFill>
@@ -14340,7 +14624,7 @@
               <a:t>document</a:t>
             </a:r>
             <a:r>
-              <a:rPr lang="en-US" altLang="ko-KR" b="0">
+              <a:rPr lang="en-US" altLang="ko-KR" b="0" dirty="0" err="1">
                 <a:solidFill>
                   <a:srgbClr val="3B3B3B"/>
                 </a:solidFill>
@@ -14350,7 +14634,7 @@
               <a:t>.</a:t>
             </a:r>
             <a:r>
-              <a:rPr lang="en-US" altLang="ko-KR" b="0">
+              <a:rPr lang="en-US" altLang="ko-KR" b="0" dirty="0" err="1">
                 <a:solidFill>
                   <a:srgbClr val="795E26"/>
                 </a:solidFill>
@@ -14360,7 +14644,7 @@
               <a:t>querySelector</a:t>
             </a:r>
             <a:r>
-              <a:rPr lang="en-US" altLang="ko-KR" b="0">
+              <a:rPr lang="en-US" altLang="ko-KR" b="0" dirty="0">
                 <a:solidFill>
                   <a:srgbClr val="3B3B3B"/>
                 </a:solidFill>
@@ -14370,7 +14654,7 @@
               <a:t>(</a:t>
             </a:r>
             <a:r>
-              <a:rPr lang="en-US" altLang="ko-KR" b="0">
+              <a:rPr lang="en-US" altLang="ko-KR" b="0" dirty="0">
                 <a:solidFill>
                   <a:srgbClr val="A31515"/>
                 </a:solidFill>
@@ -14380,7 +14664,7 @@
               <a:t>'#purchases'</a:t>
             </a:r>
             <a:r>
-              <a:rPr lang="en-US" altLang="ko-KR" b="0">
+              <a:rPr lang="en-US" altLang="ko-KR" b="0" dirty="0">
                 <a:solidFill>
                   <a:srgbClr val="3B3B3B"/>
                 </a:solidFill>
@@ -14392,7 +14676,7 @@
           </a:p>
           <a:p>
             <a:r>
-              <a:rPr lang="en-US" altLang="ko-KR" b="0">
+              <a:rPr lang="en-US" altLang="ko-KR" b="0" dirty="0">
                 <a:solidFill>
                   <a:srgbClr val="001080"/>
                 </a:solidFill>
@@ -14402,7 +14686,7 @@
               <a:t>console</a:t>
             </a:r>
             <a:r>
-              <a:rPr lang="en-US" altLang="ko-KR" b="0">
+              <a:rPr lang="en-US" altLang="ko-KR" b="0" dirty="0">
                 <a:solidFill>
                   <a:srgbClr val="3B3B3B"/>
                 </a:solidFill>
@@ -14412,7 +14696,7 @@
               <a:t>.</a:t>
             </a:r>
             <a:r>
-              <a:rPr lang="en-US" altLang="ko-KR" b="0">
+              <a:rPr lang="en-US" altLang="ko-KR" b="0" dirty="0">
                 <a:solidFill>
                   <a:srgbClr val="795E26"/>
                 </a:solidFill>
@@ -14422,7 +14706,7 @@
               <a:t>log</a:t>
             </a:r>
             <a:r>
-              <a:rPr lang="en-US" altLang="ko-KR" b="0">
+              <a:rPr lang="en-US" altLang="ko-KR" b="0" dirty="0">
                 <a:solidFill>
                   <a:srgbClr val="3B3B3B"/>
                 </a:solidFill>
@@ -14432,7 +14716,7 @@
               <a:t>(</a:t>
             </a:r>
             <a:r>
-              <a:rPr lang="en-US" altLang="ko-KR" b="0">
+              <a:rPr lang="en-US" altLang="ko-KR" b="0" dirty="0" err="1">
                 <a:solidFill>
                   <a:srgbClr val="0070C1"/>
                 </a:solidFill>
@@ -14442,7 +14726,7 @@
               <a:t>shoppingList</a:t>
             </a:r>
             <a:r>
-              <a:rPr lang="en-US" altLang="ko-KR" b="0">
+              <a:rPr lang="en-US" altLang="ko-KR" b="0" dirty="0" err="1">
                 <a:solidFill>
                   <a:srgbClr val="3B3B3B"/>
                 </a:solidFill>
@@ -14452,7 +14736,7 @@
               <a:t>.</a:t>
             </a:r>
             <a:r>
-              <a:rPr lang="en-US" altLang="ko-KR" b="0">
+              <a:rPr lang="en-US" altLang="ko-KR" b="0" dirty="0" err="1">
                 <a:solidFill>
                   <a:srgbClr val="001080"/>
                 </a:solidFill>
@@ -14462,7 +14746,7 @@
               <a:t>innerHTML</a:t>
             </a:r>
             <a:r>
-              <a:rPr lang="en-US" altLang="ko-KR" b="0">
+              <a:rPr lang="en-US" altLang="ko-KR" b="0" dirty="0">
                 <a:solidFill>
                   <a:srgbClr val="3B3B3B"/>
                 </a:solidFill>
@@ -14508,7 +14792,7 @@
           <a:lstStyle/>
           <a:p>
             <a:r>
-              <a:rPr lang="en-US" altLang="ko-KR" b="0">
+              <a:rPr lang="en-US" altLang="ko-KR" b="0" dirty="0">
                 <a:solidFill>
                   <a:srgbClr val="0000FF"/>
                 </a:solidFill>
@@ -14518,7 +14802,7 @@
               <a:t>const</a:t>
             </a:r>
             <a:r>
-              <a:rPr lang="en-US" altLang="ko-KR" b="0">
+              <a:rPr lang="en-US" altLang="ko-KR" b="0" dirty="0">
                 <a:solidFill>
                   <a:srgbClr val="3B3B3B"/>
                 </a:solidFill>
@@ -14528,7 +14812,7 @@
               <a:t> </a:t>
             </a:r>
             <a:r>
-              <a:rPr lang="en-US" altLang="ko-KR" b="0">
+              <a:rPr lang="en-US" altLang="ko-KR" b="0" dirty="0" err="1">
                 <a:solidFill>
                   <a:srgbClr val="0070C1"/>
                 </a:solidFill>
@@ -14538,7 +14822,7 @@
               <a:t>shoppingList</a:t>
             </a:r>
             <a:r>
-              <a:rPr lang="en-US" altLang="ko-KR" b="0">
+              <a:rPr lang="en-US" altLang="ko-KR" b="0" dirty="0">
                 <a:solidFill>
                   <a:srgbClr val="3B3B3B"/>
                 </a:solidFill>
@@ -14548,7 +14832,7 @@
               <a:t> </a:t>
             </a:r>
             <a:r>
-              <a:rPr lang="en-US" altLang="ko-KR" b="0">
+              <a:rPr lang="en-US" altLang="ko-KR" b="0" dirty="0">
                 <a:solidFill>
                   <a:srgbClr val="000000"/>
                 </a:solidFill>
@@ -14558,7 +14842,7 @@
               <a:t>=</a:t>
             </a:r>
             <a:r>
-              <a:rPr lang="en-US" altLang="ko-KR" b="0">
+              <a:rPr lang="en-US" altLang="ko-KR" b="0" dirty="0">
                 <a:solidFill>
                   <a:srgbClr val="3B3B3B"/>
                 </a:solidFill>
@@ -14568,7 +14852,7 @@
               <a:t> </a:t>
             </a:r>
             <a:r>
-              <a:rPr lang="en-US" altLang="ko-KR" b="0">
+              <a:rPr lang="en-US" altLang="ko-KR" b="0" dirty="0" err="1">
                 <a:solidFill>
                   <a:srgbClr val="001080"/>
                 </a:solidFill>
@@ -14578,7 +14862,7 @@
               <a:t>document</a:t>
             </a:r>
             <a:r>
-              <a:rPr lang="en-US" altLang="ko-KR" b="0">
+              <a:rPr lang="en-US" altLang="ko-KR" b="0" dirty="0" err="1">
                 <a:solidFill>
                   <a:srgbClr val="3B3B3B"/>
                 </a:solidFill>
@@ -14588,7 +14872,7 @@
               <a:t>.</a:t>
             </a:r>
             <a:r>
-              <a:rPr lang="en-US" altLang="ko-KR" b="0">
+              <a:rPr lang="en-US" altLang="ko-KR" b="0" dirty="0" err="1">
                 <a:solidFill>
                   <a:srgbClr val="795E26"/>
                 </a:solidFill>
@@ -14598,7 +14882,7 @@
               <a:t>querySelector</a:t>
             </a:r>
             <a:r>
-              <a:rPr lang="en-US" altLang="ko-KR" b="0">
+              <a:rPr lang="en-US" altLang="ko-KR" b="0" dirty="0">
                 <a:solidFill>
                   <a:srgbClr val="3B3B3B"/>
                 </a:solidFill>
@@ -14608,7 +14892,7 @@
               <a:t>(</a:t>
             </a:r>
             <a:r>
-              <a:rPr lang="en-US" altLang="ko-KR" b="0">
+              <a:rPr lang="en-US" altLang="ko-KR" b="0" dirty="0">
                 <a:solidFill>
                   <a:srgbClr val="A31515"/>
                 </a:solidFill>
@@ -14618,7 +14902,7 @@
               <a:t>'#purchases'</a:t>
             </a:r>
             <a:r>
-              <a:rPr lang="en-US" altLang="ko-KR" b="0">
+              <a:rPr lang="en-US" altLang="ko-KR" b="0" dirty="0">
                 <a:solidFill>
                   <a:srgbClr val="3B3B3B"/>
                 </a:solidFill>
@@ -14630,7 +14914,7 @@
           </a:p>
           <a:p>
             <a:r>
-              <a:rPr lang="en-US" altLang="ko-KR" b="0">
+              <a:rPr lang="en-US" altLang="ko-KR" b="0" dirty="0">
                 <a:solidFill>
                   <a:srgbClr val="001080"/>
                 </a:solidFill>
@@ -14640,7 +14924,7 @@
               <a:t>console</a:t>
             </a:r>
             <a:r>
-              <a:rPr lang="en-US" altLang="ko-KR" b="0">
+              <a:rPr lang="en-US" altLang="ko-KR" b="0" dirty="0">
                 <a:solidFill>
                   <a:srgbClr val="3B3B3B"/>
                 </a:solidFill>
@@ -14650,7 +14934,7 @@
               <a:t>.</a:t>
             </a:r>
             <a:r>
-              <a:rPr lang="en-US" altLang="ko-KR" b="0">
+              <a:rPr lang="en-US" altLang="ko-KR" b="0" dirty="0">
                 <a:solidFill>
                   <a:srgbClr val="795E26"/>
                 </a:solidFill>
@@ -14660,7 +14944,7 @@
               <a:t>log</a:t>
             </a:r>
             <a:r>
-              <a:rPr lang="en-US" altLang="ko-KR" b="0">
+              <a:rPr lang="en-US" altLang="ko-KR" b="0" dirty="0">
                 <a:solidFill>
                   <a:srgbClr val="3B3B3B"/>
                 </a:solidFill>
@@ -14670,7 +14954,7 @@
               <a:t>(</a:t>
             </a:r>
             <a:r>
-              <a:rPr lang="en-US" altLang="ko-KR" b="0">
+              <a:rPr lang="en-US" altLang="ko-KR" b="0" dirty="0" err="1">
                 <a:solidFill>
                   <a:srgbClr val="0070C1"/>
                 </a:solidFill>
@@ -14680,7 +14964,7 @@
               <a:t>shoppingList</a:t>
             </a:r>
             <a:r>
-              <a:rPr lang="en-US" altLang="ko-KR" b="0">
+              <a:rPr lang="en-US" altLang="ko-KR" b="0" dirty="0" err="1">
                 <a:solidFill>
                   <a:srgbClr val="3B3B3B"/>
                 </a:solidFill>
@@ -14690,7 +14974,7 @@
               <a:t>.</a:t>
             </a:r>
             <a:r>
-              <a:rPr lang="en-US" altLang="ko-KR" b="0">
+              <a:rPr lang="en-US" altLang="ko-KR" b="0" dirty="0" err="1">
                 <a:solidFill>
                   <a:srgbClr val="001080"/>
                 </a:solidFill>
@@ -14700,7 +14984,7 @@
               <a:t>outerHTML</a:t>
             </a:r>
             <a:r>
-              <a:rPr lang="en-US" altLang="ko-KR" b="0">
+              <a:rPr lang="en-US" altLang="ko-KR" b="0" dirty="0">
                 <a:solidFill>
                   <a:srgbClr val="3B3B3B"/>
                 </a:solidFill>
@@ -14891,14 +15175,14 @@
               <a:defRPr/>
             </a:pPr>
             <a:r>
-              <a:rPr lang="en-US" altLang="ko-KR" sz="2000">
+              <a:rPr lang="en-US" altLang="ko-KR" sz="2000" dirty="0">
                 <a:latin typeface="Noto Sans CJK KR Regular" panose="020B0500000000000000" pitchFamily="34" charset="-127"/>
                 <a:ea typeface="Noto Sans CJK KR Regular" panose="020B0500000000000000" pitchFamily="34" charset="-127"/>
               </a:rPr>
               <a:t> </a:t>
             </a:r>
             <a:r>
-              <a:rPr lang="en-US" altLang="ko-KR" sz="2000">
+              <a:rPr lang="en-US" altLang="ko-KR" sz="2000" dirty="0" err="1">
                 <a:solidFill>
                   <a:srgbClr val="FF9E1B"/>
                 </a:solidFill>
@@ -14907,6 +15191,13 @@
               </a:rPr>
               <a:t>elem.textContent</a:t>
             </a:r>
+            <a:endParaRPr lang="en-US" altLang="ko-KR" sz="2000" dirty="0">
+              <a:solidFill>
+                <a:srgbClr val="FF9E1B"/>
+              </a:solidFill>
+              <a:latin typeface="Noto Sans CJK KR Regular" panose="020B0500000000000000" pitchFamily="34" charset="-127"/>
+              <a:ea typeface="Noto Sans CJK KR Regular" panose="020B0500000000000000" pitchFamily="34" charset="-127"/>
+            </a:endParaRPr>
           </a:p>
           <a:p>
             <a:pPr lvl="1">
@@ -14915,34 +15206,34 @@
               <a:defRPr/>
             </a:pPr>
             <a:r>
-              <a:rPr lang="ko-KR" altLang="en-US">
+              <a:rPr lang="ko-KR" altLang="en-US" dirty="0">
                 <a:latin typeface="Noto Sans CJK KR Regular" panose="020B0500000000000000" pitchFamily="34" charset="-127"/>
                 <a:ea typeface="Noto Sans CJK KR Regular" panose="020B0500000000000000" pitchFamily="34" charset="-127"/>
               </a:rPr>
               <a:t> </a:t>
             </a:r>
             <a:r>
-              <a:rPr lang="en-US" altLang="ko-KR" b="0">
+              <a:rPr lang="en-US" altLang="ko-KR" b="0" dirty="0" err="1">
                 <a:latin typeface="Noto Sans CJK KR Regular" panose="020B0500000000000000" pitchFamily="34" charset="-127"/>
                 <a:ea typeface="Noto Sans CJK KR Regular" panose="020B0500000000000000" pitchFamily="34" charset="-127"/>
               </a:rPr>
               <a:t>elem</a:t>
             </a:r>
             <a:r>
-              <a:rPr lang="ko-KR" altLang="en-US" b="0">
+              <a:rPr lang="ko-KR" altLang="en-US" b="0" dirty="0">
                 <a:latin typeface="Noto Sans CJK KR Regular" panose="020B0500000000000000" pitchFamily="34" charset="-127"/>
                 <a:ea typeface="Noto Sans CJK KR Regular" panose="020B0500000000000000" pitchFamily="34" charset="-127"/>
               </a:rPr>
               <a:t>의 내부 </a:t>
             </a:r>
             <a:r>
-              <a:rPr lang="ko-KR" altLang="en-US">
+              <a:rPr lang="ko-KR" altLang="en-US" dirty="0">
                 <a:latin typeface="Noto Sans CJK KR Regular" panose="020B0500000000000000" pitchFamily="34" charset="-127"/>
                 <a:ea typeface="Noto Sans CJK KR Regular" panose="020B0500000000000000" pitchFamily="34" charset="-127"/>
               </a:rPr>
               <a:t>텍스트 노드의 값을 조회하거나 수정</a:t>
             </a:r>
-            <a:endParaRPr lang="en-US" altLang="ko-KR">
+            <a:endParaRPr lang="en-US" altLang="ko-KR" dirty="0">
               <a:latin typeface="Noto Sans CJK KR Regular" panose="020B0500000000000000" pitchFamily="34" charset="-127"/>
               <a:ea typeface="Noto Sans CJK KR Regular" panose="020B0500000000000000" pitchFamily="34" charset="-127"/>
             </a:endParaRPr>
@@ -14954,20 +15245,20 @@
               <a:defRPr/>
             </a:pPr>
             <a:r>
-              <a:rPr lang="en-US" altLang="ko-KR">
+              <a:rPr lang="en-US" altLang="ko-KR" dirty="0">
                 <a:latin typeface="Noto Sans CJK KR Regular" panose="020B0500000000000000" pitchFamily="34" charset="-127"/>
                 <a:ea typeface="Noto Sans CJK KR Regular" panose="020B0500000000000000" pitchFamily="34" charset="-127"/>
               </a:rPr>
               <a:t> </a:t>
             </a:r>
             <a:r>
-              <a:rPr lang="ko-KR" altLang="en-US">
+              <a:rPr lang="ko-KR" altLang="en-US" dirty="0">
                 <a:latin typeface="Noto Sans CJK KR Regular" panose="020B0500000000000000" pitchFamily="34" charset="-127"/>
                 <a:ea typeface="Noto Sans CJK KR Regular" panose="020B0500000000000000" pitchFamily="34" charset="-127"/>
               </a:rPr>
               <a:t>소스코드의 값 그대로 조회</a:t>
             </a:r>
-            <a:endParaRPr lang="en-US" altLang="ko-KR">
+            <a:endParaRPr lang="en-US" altLang="ko-KR" dirty="0">
               <a:latin typeface="Noto Sans CJK KR Regular" panose="020B0500000000000000" pitchFamily="34" charset="-127"/>
               <a:ea typeface="Noto Sans CJK KR Regular" panose="020B0500000000000000" pitchFamily="34" charset="-127"/>
             </a:endParaRPr>
@@ -14978,7 +15269,7 @@
               <a:buChar char="•"/>
               <a:defRPr/>
             </a:pPr>
-            <a:endParaRPr lang="en-US" altLang="ko-KR" b="0">
+            <a:endParaRPr lang="en-US" altLang="ko-KR" b="0" dirty="0">
               <a:latin typeface="Noto Sans CJK KR Regular" panose="020B0500000000000000" pitchFamily="34" charset="-127"/>
               <a:ea typeface="Noto Sans CJK KR Regular" panose="020B0500000000000000" pitchFamily="34" charset="-127"/>
             </a:endParaRPr>
@@ -14989,7 +15280,7 @@
               <a:buChar char="•"/>
               <a:defRPr/>
             </a:pPr>
-            <a:endParaRPr lang="en-US" altLang="ko-KR">
+            <a:endParaRPr lang="en-US" altLang="ko-KR" dirty="0">
               <a:latin typeface="Noto Sans CJK KR Regular" panose="020B0500000000000000" pitchFamily="34" charset="-127"/>
               <a:ea typeface="Noto Sans CJK KR Regular" panose="020B0500000000000000" pitchFamily="34" charset="-127"/>
             </a:endParaRPr>
@@ -15000,7 +15291,7 @@
               <a:buChar char="•"/>
               <a:defRPr/>
             </a:pPr>
-            <a:endParaRPr lang="en-US" altLang="ko-KR" b="0">
+            <a:endParaRPr lang="en-US" altLang="ko-KR" b="0" dirty="0">
               <a:latin typeface="Noto Sans CJK KR Regular" panose="020B0500000000000000" pitchFamily="34" charset="-127"/>
               <a:ea typeface="Noto Sans CJK KR Regular" panose="020B0500000000000000" pitchFamily="34" charset="-127"/>
             </a:endParaRPr>
@@ -15011,7 +15302,7 @@
               <a:buChar char="▶"/>
               <a:defRPr/>
             </a:pPr>
-            <a:endParaRPr lang="en-US" altLang="ko-KR" sz="2000">
+            <a:endParaRPr lang="en-US" altLang="ko-KR" sz="2000" dirty="0">
               <a:latin typeface="Noto Sans CJK KR Regular" panose="020B0500000000000000" pitchFamily="34" charset="-127"/>
               <a:ea typeface="Noto Sans CJK KR Regular" panose="020B0500000000000000" pitchFamily="34" charset="-127"/>
             </a:endParaRPr>
@@ -15020,7 +15311,7 @@
             <a:pPr>
               <a:defRPr/>
             </a:pPr>
-            <a:endParaRPr lang="en-US" altLang="ko-KR" sz="2000">
+            <a:endParaRPr lang="en-US" altLang="ko-KR" sz="2000" dirty="0">
               <a:latin typeface="Noto Sans CJK KR Regular" panose="020B0500000000000000" pitchFamily="34" charset="-127"/>
               <a:ea typeface="Noto Sans CJK KR Regular" panose="020B0500000000000000" pitchFamily="34" charset="-127"/>
             </a:endParaRPr>
@@ -15031,7 +15322,7 @@
               <a:buChar char="▶"/>
               <a:defRPr/>
             </a:pPr>
-            <a:endParaRPr lang="en-US" altLang="ko-KR" sz="2000">
+            <a:endParaRPr lang="en-US" altLang="ko-KR" sz="2000" dirty="0">
               <a:latin typeface="Noto Sans CJK KR Regular" panose="020B0500000000000000" pitchFamily="34" charset="-127"/>
               <a:ea typeface="Noto Sans CJK KR Regular" panose="020B0500000000000000" pitchFamily="34" charset="-127"/>
             </a:endParaRPr>
@@ -15043,12 +15334,23 @@
               <a:defRPr/>
             </a:pPr>
             <a:r>
-              <a:rPr lang="en-US" altLang="ko-KR" sz="2000">
-                <a:latin typeface="Noto Sans CJK KR Regular" panose="020B0500000000000000" pitchFamily="34" charset="-127"/>
-                <a:ea typeface="Noto Sans CJK KR Regular" panose="020B0500000000000000" pitchFamily="34" charset="-127"/>
-              </a:rPr>
-              <a:t> elem.innerText</a:t>
-            </a:r>
+              <a:rPr lang="en-US" altLang="ko-KR" sz="2000" dirty="0">
+                <a:latin typeface="Noto Sans CJK KR Regular" panose="020B0500000000000000" pitchFamily="34" charset="-127"/>
+                <a:ea typeface="Noto Sans CJK KR Regular" panose="020B0500000000000000" pitchFamily="34" charset="-127"/>
+              </a:rPr>
+              <a:t> </a:t>
+            </a:r>
+            <a:r>
+              <a:rPr lang="en-US" altLang="ko-KR" sz="2000" dirty="0" err="1">
+                <a:latin typeface="Noto Sans CJK KR Regular" panose="020B0500000000000000" pitchFamily="34" charset="-127"/>
+                <a:ea typeface="Noto Sans CJK KR Regular" panose="020B0500000000000000" pitchFamily="34" charset="-127"/>
+              </a:rPr>
+              <a:t>elem.innerText</a:t>
+            </a:r>
+            <a:endParaRPr lang="en-US" altLang="ko-KR" sz="2000" dirty="0">
+              <a:latin typeface="Noto Sans CJK KR Regular" panose="020B0500000000000000" pitchFamily="34" charset="-127"/>
+              <a:ea typeface="Noto Sans CJK KR Regular" panose="020B0500000000000000" pitchFamily="34" charset="-127"/>
+            </a:endParaRPr>
           </a:p>
           <a:p>
             <a:pPr lvl="1">
@@ -15057,34 +15359,34 @@
               <a:defRPr/>
             </a:pPr>
             <a:r>
-              <a:rPr lang="ko-KR" altLang="en-US">
+              <a:rPr lang="ko-KR" altLang="en-US" dirty="0">
                 <a:latin typeface="Noto Sans CJK KR Regular" panose="020B0500000000000000" pitchFamily="34" charset="-127"/>
                 <a:ea typeface="Noto Sans CJK KR Regular" panose="020B0500000000000000" pitchFamily="34" charset="-127"/>
               </a:rPr>
               <a:t> </a:t>
             </a:r>
             <a:r>
-              <a:rPr lang="en-US" altLang="ko-KR" b="0">
+              <a:rPr lang="en-US" altLang="ko-KR" b="0" dirty="0" err="1">
                 <a:latin typeface="Noto Sans CJK KR Regular" panose="020B0500000000000000" pitchFamily="34" charset="-127"/>
                 <a:ea typeface="Noto Sans CJK KR Regular" panose="020B0500000000000000" pitchFamily="34" charset="-127"/>
               </a:rPr>
               <a:t>elem</a:t>
             </a:r>
             <a:r>
-              <a:rPr lang="ko-KR" altLang="en-US" b="0">
+              <a:rPr lang="ko-KR" altLang="en-US" b="0" dirty="0">
                 <a:latin typeface="Noto Sans CJK KR Regular" panose="020B0500000000000000" pitchFamily="34" charset="-127"/>
                 <a:ea typeface="Noto Sans CJK KR Regular" panose="020B0500000000000000" pitchFamily="34" charset="-127"/>
               </a:rPr>
               <a:t>의 내부 </a:t>
             </a:r>
             <a:r>
-              <a:rPr lang="ko-KR" altLang="en-US">
+              <a:rPr lang="ko-KR" altLang="en-US" dirty="0">
                 <a:latin typeface="Noto Sans CJK KR Regular" panose="020B0500000000000000" pitchFamily="34" charset="-127"/>
                 <a:ea typeface="Noto Sans CJK KR Regular" panose="020B0500000000000000" pitchFamily="34" charset="-127"/>
               </a:rPr>
               <a:t>텍스트 노드의 값을 조회하거나 수정</a:t>
             </a:r>
-            <a:endParaRPr lang="en-US" altLang="ko-KR">
+            <a:endParaRPr lang="en-US" altLang="ko-KR" dirty="0">
               <a:latin typeface="Noto Sans CJK KR Regular" panose="020B0500000000000000" pitchFamily="34" charset="-127"/>
               <a:ea typeface="Noto Sans CJK KR Regular" panose="020B0500000000000000" pitchFamily="34" charset="-127"/>
             </a:endParaRPr>
@@ -15096,20 +15398,20 @@
               <a:defRPr/>
             </a:pPr>
             <a:r>
-              <a:rPr lang="en-US" altLang="ko-KR">
+              <a:rPr lang="en-US" altLang="ko-KR" dirty="0">
                 <a:latin typeface="Noto Sans CJK KR Regular" panose="020B0500000000000000" pitchFamily="34" charset="-127"/>
                 <a:ea typeface="Noto Sans CJK KR Regular" panose="020B0500000000000000" pitchFamily="34" charset="-127"/>
               </a:rPr>
               <a:t> </a:t>
             </a:r>
             <a:r>
-              <a:rPr lang="ko-KR" altLang="en-US">
+              <a:rPr lang="ko-KR" altLang="en-US" dirty="0">
                 <a:latin typeface="Noto Sans CJK KR Regular" panose="020B0500000000000000" pitchFamily="34" charset="-127"/>
                 <a:ea typeface="Noto Sans CJK KR Regular" panose="020B0500000000000000" pitchFamily="34" charset="-127"/>
               </a:rPr>
               <a:t>브라우저에 의해서 실제 보이는 값으로 조회</a:t>
             </a:r>
-            <a:endParaRPr lang="en-US" altLang="ko-KR">
+            <a:endParaRPr lang="en-US" altLang="ko-KR" dirty="0">
               <a:latin typeface="Noto Sans CJK KR Regular" panose="020B0500000000000000" pitchFamily="34" charset="-127"/>
               <a:ea typeface="Noto Sans CJK KR Regular" panose="020B0500000000000000" pitchFamily="34" charset="-127"/>
             </a:endParaRPr>
@@ -15121,27 +15423,27 @@
               <a:defRPr/>
             </a:pPr>
             <a:r>
-              <a:rPr lang="en-US" altLang="ko-KR" b="0">
+              <a:rPr lang="en-US" altLang="ko-KR" b="0" dirty="0">
                 <a:latin typeface="Noto Sans CJK KR Regular" panose="020B0500000000000000" pitchFamily="34" charset="-127"/>
                 <a:ea typeface="Noto Sans CJK KR Regular" panose="020B0500000000000000" pitchFamily="34" charset="-127"/>
               </a:rPr>
               <a:t> </a:t>
             </a:r>
             <a:r>
-              <a:rPr lang="ko-KR" altLang="en-US">
+              <a:rPr lang="ko-KR" altLang="en-US" dirty="0">
                 <a:latin typeface="Noto Sans CJK KR Regular" panose="020B0500000000000000" pitchFamily="34" charset="-127"/>
                 <a:ea typeface="Noto Sans CJK KR Regular" panose="020B0500000000000000" pitchFamily="34" charset="-127"/>
               </a:rPr>
               <a:t>화면에 보이지 않는 요소는 제외</a:t>
             </a:r>
             <a:r>
-              <a:rPr lang="en-US" altLang="ko-KR">
+              <a:rPr lang="en-US" altLang="ko-KR" dirty="0">
                 <a:latin typeface="Noto Sans CJK KR Regular" panose="020B0500000000000000" pitchFamily="34" charset="-127"/>
                 <a:ea typeface="Noto Sans CJK KR Regular" panose="020B0500000000000000" pitchFamily="34" charset="-127"/>
               </a:rPr>
               <a:t>(hidden)</a:t>
             </a:r>
-            <a:endParaRPr lang="en-US" altLang="ko-KR" b="0">
+            <a:endParaRPr lang="en-US" altLang="ko-KR" b="0" dirty="0">
               <a:latin typeface="Noto Sans CJK KR Regular" panose="020B0500000000000000" pitchFamily="34" charset="-127"/>
               <a:ea typeface="Noto Sans CJK KR Regular" panose="020B0500000000000000" pitchFamily="34" charset="-127"/>
             </a:endParaRPr>
@@ -15296,7 +15598,7 @@
           <a:lstStyle/>
           <a:p>
             <a:r>
-              <a:rPr lang="en-US" altLang="ko-KR" b="0">
+              <a:rPr lang="en-US" altLang="ko-KR" b="0" dirty="0">
                 <a:solidFill>
                   <a:srgbClr val="3B3B3B"/>
                 </a:solidFill>
@@ -15306,106 +15608,116 @@
               <a:t>  </a:t>
             </a:r>
             <a:r>
-              <a:rPr lang="en-US" altLang="ko-KR" b="0">
+              <a:rPr lang="en-US" altLang="ko-KR" b="0" dirty="0">
                 <a:solidFill>
                   <a:srgbClr val="800000"/>
                 </a:solidFill>
                 <a:effectLst/>
                 <a:latin typeface="Consolas" panose="020B0609020204030204" pitchFamily="49" charset="0"/>
               </a:rPr>
-              <a:t>&lt;ul</a:t>
-            </a:r>
-            <a:r>
-              <a:rPr lang="en-US" altLang="ko-KR" b="0">
-                <a:solidFill>
-                  <a:srgbClr val="3B3B3B"/>
+              <a:t>&lt;</a:t>
+            </a:r>
+            <a:r>
+              <a:rPr lang="en-US" altLang="ko-KR" b="0" dirty="0" err="1">
+                <a:solidFill>
+                  <a:srgbClr val="800000"/>
                 </a:solidFill>
                 <a:effectLst/>
                 <a:latin typeface="Consolas" panose="020B0609020204030204" pitchFamily="49" charset="0"/>
               </a:rPr>
-              <a:t> </a:t>
-            </a:r>
-            <a:r>
-              <a:rPr lang="en-US" altLang="ko-KR" b="0">
-                <a:solidFill>
-                  <a:srgbClr val="E50000"/>
+              <a:t>ul</a:t>
+            </a:r>
+            <a:r>
+              <a:rPr lang="en-US" altLang="ko-KR" b="0" dirty="0">
+                <a:solidFill>
+                  <a:srgbClr val="3B3B3B"/>
                 </a:solidFill>
                 <a:effectLst/>
                 <a:latin typeface="Consolas" panose="020B0609020204030204" pitchFamily="49" charset="0"/>
               </a:rPr>
-              <a:t>id</a:t>
-            </a:r>
-            <a:r>
-              <a:rPr lang="en-US" altLang="ko-KR" b="0">
-                <a:solidFill>
-                  <a:srgbClr val="3B3B3B"/>
+              <a:t> </a:t>
+            </a:r>
+            <a:r>
+              <a:rPr lang="en-US" altLang="ko-KR" b="0" dirty="0">
+                <a:solidFill>
+                  <a:srgbClr val="E50000"/>
                 </a:solidFill>
                 <a:effectLst/>
                 <a:latin typeface="Consolas" panose="020B0609020204030204" pitchFamily="49" charset="0"/>
               </a:rPr>
-              <a:t>=</a:t>
-            </a:r>
-            <a:r>
-              <a:rPr lang="en-US" altLang="ko-KR" b="0">
-                <a:solidFill>
-                  <a:srgbClr val="0000FF"/>
+              <a:t>id</a:t>
+            </a:r>
+            <a:r>
+              <a:rPr lang="en-US" altLang="ko-KR" b="0" dirty="0">
+                <a:solidFill>
+                  <a:srgbClr val="3B3B3B"/>
                 </a:solidFill>
                 <a:effectLst/>
                 <a:latin typeface="Consolas" panose="020B0609020204030204" pitchFamily="49" charset="0"/>
               </a:rPr>
-              <a:t>"purchases"</a:t>
-            </a:r>
-            <a:r>
-              <a:rPr lang="en-US" altLang="ko-KR" b="0">
-                <a:solidFill>
-                  <a:srgbClr val="3B3B3B"/>
+              <a:t>=</a:t>
+            </a:r>
+            <a:r>
+              <a:rPr lang="en-US" altLang="ko-KR" b="0" dirty="0">
+                <a:solidFill>
+                  <a:srgbClr val="0000FF"/>
                 </a:solidFill>
                 <a:effectLst/>
                 <a:latin typeface="Consolas" panose="020B0609020204030204" pitchFamily="49" charset="0"/>
               </a:rPr>
-              <a:t> </a:t>
-            </a:r>
-            <a:r>
-              <a:rPr lang="en-US" altLang="ko-KR" b="0">
-                <a:solidFill>
-                  <a:srgbClr val="E50000"/>
+              <a:t>"purchases"</a:t>
+            </a:r>
+            <a:r>
+              <a:rPr lang="en-US" altLang="ko-KR" b="0" dirty="0">
+                <a:solidFill>
+                  <a:srgbClr val="3B3B3B"/>
                 </a:solidFill>
                 <a:effectLst/>
                 <a:latin typeface="Consolas" panose="020B0609020204030204" pitchFamily="49" charset="0"/>
               </a:rPr>
-              <a:t>class</a:t>
-            </a:r>
-            <a:r>
-              <a:rPr lang="en-US" altLang="ko-KR" b="0">
-                <a:solidFill>
-                  <a:srgbClr val="3B3B3B"/>
+              <a:t> </a:t>
+            </a:r>
+            <a:r>
+              <a:rPr lang="en-US" altLang="ko-KR" b="0" dirty="0">
+                <a:solidFill>
+                  <a:srgbClr val="E50000"/>
                 </a:solidFill>
                 <a:effectLst/>
                 <a:latin typeface="Consolas" panose="020B0609020204030204" pitchFamily="49" charset="0"/>
               </a:rPr>
-              <a:t>=</a:t>
-            </a:r>
-            <a:r>
-              <a:rPr lang="en-US" altLang="ko-KR" b="0">
-                <a:solidFill>
-                  <a:srgbClr val="0000FF"/>
+              <a:t>class</a:t>
+            </a:r>
+            <a:r>
+              <a:rPr lang="en-US" altLang="ko-KR" b="0" dirty="0">
+                <a:solidFill>
+                  <a:srgbClr val="3B3B3B"/>
                 </a:solidFill>
                 <a:effectLst/>
                 <a:latin typeface="Consolas" panose="020B0609020204030204" pitchFamily="49" charset="0"/>
               </a:rPr>
-              <a:t>"list"</a:t>
-            </a:r>
-            <a:r>
-              <a:rPr lang="en-US" altLang="ko-KR" b="0">
-                <a:solidFill>
-                  <a:srgbClr val="800000"/>
+              <a:t>=</a:t>
+            </a:r>
+            <a:r>
+              <a:rPr lang="en-US" altLang="ko-KR" b="0" dirty="0">
+                <a:solidFill>
+                  <a:srgbClr val="0000FF"/>
                 </a:solidFill>
                 <a:effectLst/>
                 <a:latin typeface="Consolas" panose="020B0609020204030204" pitchFamily="49" charset="0"/>
               </a:rPr>
+              <a:t>"list"</a:t>
+            </a:r>
+            <a:r>
+              <a:rPr lang="en-US" altLang="ko-KR" b="0" dirty="0">
+                <a:solidFill>
+                  <a:srgbClr val="800000"/>
+                </a:solidFill>
+                <a:effectLst/>
+                <a:latin typeface="Consolas" panose="020B0609020204030204" pitchFamily="49" charset="0"/>
+              </a:rPr>
               <a:t>&gt;</a:t>
             </a:r>
-            <a:endParaRPr lang="en-US" altLang="ko-KR" b="0">
+            <a:endParaRPr lang="en-US" altLang="ko-KR" b="0" dirty="0">
               <a:solidFill>
                 <a:srgbClr val="3B3B3B"/>
               </a:solidFill>
@@ -15415,7 +15727,7 @@
           </a:p>
           <a:p>
             <a:r>
-              <a:rPr lang="en-US" altLang="ko-KR" b="0">
+              <a:rPr lang="en-US" altLang="ko-KR" b="0" dirty="0">
                 <a:solidFill>
                   <a:srgbClr val="3B3B3B"/>
                 </a:solidFill>
@@ -15425,7 +15737,7 @@
               <a:t>    </a:t>
             </a:r>
             <a:r>
-              <a:rPr lang="en-US" altLang="ko-KR" b="0">
+              <a:rPr lang="en-US" altLang="ko-KR" b="0" dirty="0">
                 <a:solidFill>
                   <a:srgbClr val="800000"/>
                 </a:solidFill>
@@ -15435,7 +15747,7 @@
               <a:t>&lt;li&gt;</a:t>
             </a:r>
             <a:r>
-              <a:rPr lang="ko-KR" altLang="en-US" b="0">
+              <a:rPr lang="ko-KR" altLang="en-US" b="0" dirty="0">
                 <a:solidFill>
                   <a:srgbClr val="3B3B3B"/>
                 </a:solidFill>
@@ -15445,7 +15757,7 @@
               <a:t>두부</a:t>
             </a:r>
             <a:r>
-              <a:rPr lang="en-US" altLang="ko-KR" b="0">
+              <a:rPr lang="en-US" altLang="ko-KR" b="0" dirty="0">
                 <a:solidFill>
                   <a:srgbClr val="800000"/>
                 </a:solidFill>
@@ -15455,7 +15767,7 @@
               <a:t>&lt;span&gt;</a:t>
             </a:r>
             <a:r>
-              <a:rPr lang="en-US" altLang="ko-KR" b="0">
+              <a:rPr lang="en-US" altLang="ko-KR" b="0" dirty="0">
                 <a:solidFill>
                   <a:srgbClr val="3B3B3B"/>
                 </a:solidFill>
@@ -15465,7 +15777,7 @@
               <a:t>✔️</a:t>
             </a:r>
             <a:r>
-              <a:rPr lang="en-US" altLang="ko-KR" b="0">
+              <a:rPr lang="en-US" altLang="ko-KR" b="0" dirty="0">
                 <a:solidFill>
                   <a:srgbClr val="800000"/>
                 </a:solidFill>
@@ -15474,7 +15786,7 @@
               </a:rPr>
               <a:t>&lt;/span&gt;&lt;/li&gt;</a:t>
             </a:r>
-            <a:endParaRPr lang="en-US" altLang="ko-KR" b="0">
+            <a:endParaRPr lang="en-US" altLang="ko-KR" b="0" dirty="0">
               <a:solidFill>
                 <a:srgbClr val="3B3B3B"/>
               </a:solidFill>
@@ -15484,7 +15796,7 @@
           </a:p>
           <a:p>
             <a:r>
-              <a:rPr lang="en-US" altLang="ko-KR" b="0">
+              <a:rPr lang="en-US" altLang="ko-KR" b="0" dirty="0">
                 <a:solidFill>
                   <a:srgbClr val="3B3B3B"/>
                 </a:solidFill>
@@ -15494,7 +15806,7 @@
               <a:t>    </a:t>
             </a:r>
             <a:r>
-              <a:rPr lang="en-US" altLang="ko-KR" b="0">
+              <a:rPr lang="en-US" altLang="ko-KR" b="0" dirty="0">
                 <a:solidFill>
                   <a:srgbClr val="800000"/>
                 </a:solidFill>
@@ -15504,7 +15816,7 @@
               <a:t>&lt;li&gt;</a:t>
             </a:r>
             <a:r>
-              <a:rPr lang="ko-KR" altLang="en-US" b="0">
+              <a:rPr lang="ko-KR" altLang="en-US" b="0" dirty="0">
                 <a:solidFill>
                   <a:srgbClr val="3B3B3B"/>
                 </a:solidFill>
@@ -15514,7 +15826,7 @@
               <a:t>계란</a:t>
             </a:r>
             <a:r>
-              <a:rPr lang="en-US" altLang="ko-KR" b="0">
+              <a:rPr lang="en-US" altLang="ko-KR" b="0" dirty="0">
                 <a:solidFill>
                   <a:srgbClr val="800000"/>
                 </a:solidFill>
@@ -15524,7 +15836,7 @@
               <a:t>&lt;span</a:t>
             </a:r>
             <a:r>
-              <a:rPr lang="en-US" altLang="ko-KR" b="0">
+              <a:rPr lang="en-US" altLang="ko-KR" b="0" dirty="0">
                 <a:solidFill>
                   <a:srgbClr val="3B3B3B"/>
                 </a:solidFill>
@@ -15534,7 +15846,7 @@
               <a:t> </a:t>
             </a:r>
             <a:r>
-              <a:rPr lang="en-US" altLang="ko-KR" b="0">
+              <a:rPr lang="en-US" altLang="ko-KR" b="0" dirty="0">
                 <a:solidFill>
                   <a:srgbClr val="E50000"/>
                 </a:solidFill>
@@ -15544,7 +15856,7 @@
               <a:t>hidden</a:t>
             </a:r>
             <a:r>
-              <a:rPr lang="en-US" altLang="ko-KR" b="0">
+              <a:rPr lang="en-US" altLang="ko-KR" b="0" dirty="0">
                 <a:solidFill>
                   <a:srgbClr val="800000"/>
                 </a:solidFill>
@@ -15554,7 +15866,7 @@
               <a:t>&gt;</a:t>
             </a:r>
             <a:r>
-              <a:rPr lang="en-US" altLang="ko-KR" b="0">
+              <a:rPr lang="en-US" altLang="ko-KR" b="0" dirty="0">
                 <a:solidFill>
                   <a:srgbClr val="3B3B3B"/>
                 </a:solidFill>
@@ -15564,7 +15876,7 @@
               <a:t>✔️</a:t>
             </a:r>
             <a:r>
-              <a:rPr lang="en-US" altLang="ko-KR" b="0">
+              <a:rPr lang="en-US" altLang="ko-KR" b="0" dirty="0">
                 <a:solidFill>
                   <a:srgbClr val="800000"/>
                 </a:solidFill>
@@ -15573,7 +15885,7 @@
               </a:rPr>
               <a:t>&lt;/span&gt;&lt;/li&gt;</a:t>
             </a:r>
-            <a:endParaRPr lang="en-US" altLang="ko-KR" b="0">
+            <a:endParaRPr lang="en-US" altLang="ko-KR" b="0" dirty="0">
               <a:solidFill>
                 <a:srgbClr val="3B3B3B"/>
               </a:solidFill>
@@ -15583,7 +15895,7 @@
           </a:p>
           <a:p>
             <a:r>
-              <a:rPr lang="en-US" altLang="ko-KR" b="0">
+              <a:rPr lang="en-US" altLang="ko-KR" b="0" dirty="0">
                 <a:solidFill>
                   <a:srgbClr val="3B3B3B"/>
                 </a:solidFill>
@@ -15593,7 +15905,7 @@
               <a:t>    </a:t>
             </a:r>
             <a:r>
-              <a:rPr lang="en-US" altLang="ko-KR" b="0">
+              <a:rPr lang="en-US" altLang="ko-KR" b="0" dirty="0">
                 <a:solidFill>
                   <a:srgbClr val="800000"/>
                 </a:solidFill>
@@ -15603,7 +15915,7 @@
               <a:t>&lt;li&gt;</a:t>
             </a:r>
             <a:r>
-              <a:rPr lang="ko-KR" altLang="en-US" b="0">
+              <a:rPr lang="ko-KR" altLang="en-US" b="0" dirty="0">
                 <a:solidFill>
                   <a:srgbClr val="3B3B3B"/>
                 </a:solidFill>
@@ -15613,7 +15925,7 @@
               <a:t>라면</a:t>
             </a:r>
             <a:r>
-              <a:rPr lang="en-US" altLang="ko-KR" b="0">
+              <a:rPr lang="en-US" altLang="ko-KR" b="0" dirty="0">
                 <a:solidFill>
                   <a:srgbClr val="800000"/>
                 </a:solidFill>
@@ -15623,7 +15935,7 @@
               <a:t>&lt;span&gt;</a:t>
             </a:r>
             <a:r>
-              <a:rPr lang="en-US" altLang="ko-KR" b="0">
+              <a:rPr lang="en-US" altLang="ko-KR" b="0" dirty="0">
                 <a:solidFill>
                   <a:srgbClr val="3B3B3B"/>
                 </a:solidFill>
@@ -15633,7 +15945,7 @@
               <a:t>✔️</a:t>
             </a:r>
             <a:r>
-              <a:rPr lang="en-US" altLang="ko-KR" b="0">
+              <a:rPr lang="en-US" altLang="ko-KR" b="0" dirty="0">
                 <a:solidFill>
                   <a:srgbClr val="800000"/>
                 </a:solidFill>
@@ -15642,7 +15954,7 @@
               </a:rPr>
               <a:t>&lt;/span&gt;&lt;/li&gt;</a:t>
             </a:r>
-            <a:endParaRPr lang="en-US" altLang="ko-KR" b="0">
+            <a:endParaRPr lang="en-US" altLang="ko-KR" b="0" dirty="0">
               <a:solidFill>
                 <a:srgbClr val="3B3B3B"/>
               </a:solidFill>
@@ -15652,7 +15964,7 @@
           </a:p>
           <a:p>
             <a:r>
-              <a:rPr lang="en-US" altLang="ko-KR" b="0">
+              <a:rPr lang="en-US" altLang="ko-KR" b="0" dirty="0">
                 <a:solidFill>
                   <a:srgbClr val="3B3B3B"/>
                 </a:solidFill>
@@ -15662,16 +15974,36 @@
               <a:t>  </a:t>
             </a:r>
             <a:r>
-              <a:rPr lang="en-US" altLang="ko-KR" b="0">
+              <a:rPr lang="en-US" altLang="ko-KR" b="0" dirty="0">
                 <a:solidFill>
                   <a:srgbClr val="800000"/>
                 </a:solidFill>
                 <a:effectLst/>
                 <a:latin typeface="Consolas" panose="020B0609020204030204" pitchFamily="49" charset="0"/>
               </a:rPr>
-              <a:t>&lt;/ul&gt;</a:t>
-            </a:r>
-            <a:endParaRPr lang="en-US" altLang="ko-KR" b="0">
+              <a:t>&lt;/</a:t>
+            </a:r>
+            <a:r>
+              <a:rPr lang="en-US" altLang="ko-KR" b="0" dirty="0" err="1">
+                <a:solidFill>
+                  <a:srgbClr val="800000"/>
+                </a:solidFill>
+                <a:effectLst/>
+                <a:latin typeface="Consolas" panose="020B0609020204030204" pitchFamily="49" charset="0"/>
+              </a:rPr>
+              <a:t>ul</a:t>
+            </a:r>
+            <a:r>
+              <a:rPr lang="en-US" altLang="ko-KR" b="0" dirty="0">
+                <a:solidFill>
+                  <a:srgbClr val="800000"/>
+                </a:solidFill>
+                <a:effectLst/>
+                <a:latin typeface="Consolas" panose="020B0609020204030204" pitchFamily="49" charset="0"/>
+              </a:rPr>
+              <a:t>&gt;</a:t>
+            </a:r>
+            <a:endParaRPr lang="en-US" altLang="ko-KR" b="0" dirty="0">
               <a:solidFill>
                 <a:srgbClr val="3B3B3B"/>
               </a:solidFill>
@@ -15715,7 +16047,7 @@
           <a:lstStyle/>
           <a:p>
             <a:r>
-              <a:rPr lang="en-US" altLang="ko-KR" b="0">
+              <a:rPr lang="en-US" altLang="ko-KR" b="0" dirty="0">
                 <a:solidFill>
                   <a:srgbClr val="0000FF"/>
                 </a:solidFill>
@@ -15725,7 +16057,7 @@
               <a:t>const</a:t>
             </a:r>
             <a:r>
-              <a:rPr lang="en-US" altLang="ko-KR" b="0">
+              <a:rPr lang="en-US" altLang="ko-KR" b="0" dirty="0">
                 <a:solidFill>
                   <a:srgbClr val="3B3B3B"/>
                 </a:solidFill>
@@ -15735,7 +16067,7 @@
               <a:t> </a:t>
             </a:r>
             <a:r>
-              <a:rPr lang="en-US" altLang="ko-KR" b="0">
+              <a:rPr lang="en-US" altLang="ko-KR" b="0" dirty="0" err="1">
                 <a:solidFill>
                   <a:srgbClr val="0070C1"/>
                 </a:solidFill>
@@ -15745,7 +16077,7 @@
               <a:t>secondLi</a:t>
             </a:r>
             <a:r>
-              <a:rPr lang="en-US" altLang="ko-KR" b="0">
+              <a:rPr lang="en-US" altLang="ko-KR" b="0" dirty="0">
                 <a:solidFill>
                   <a:srgbClr val="3B3B3B"/>
                 </a:solidFill>
@@ -15755,7 +16087,7 @@
               <a:t> </a:t>
             </a:r>
             <a:r>
-              <a:rPr lang="en-US" altLang="ko-KR" b="0">
+              <a:rPr lang="en-US" altLang="ko-KR" b="0" dirty="0">
                 <a:solidFill>
                   <a:srgbClr val="000000"/>
                 </a:solidFill>
@@ -15765,7 +16097,7 @@
               <a:t>=</a:t>
             </a:r>
             <a:r>
-              <a:rPr lang="en-US" altLang="ko-KR" b="0">
+              <a:rPr lang="en-US" altLang="ko-KR" b="0" dirty="0">
                 <a:solidFill>
                   <a:srgbClr val="3B3B3B"/>
                 </a:solidFill>
@@ -15775,7 +16107,7 @@
               <a:t> </a:t>
             </a:r>
             <a:r>
-              <a:rPr lang="en-US" altLang="ko-KR" b="0">
+              <a:rPr lang="en-US" altLang="ko-KR" b="0" dirty="0" err="1">
                 <a:solidFill>
                   <a:srgbClr val="001080"/>
                 </a:solidFill>
@@ -15785,7 +16117,7 @@
               <a:t>document</a:t>
             </a:r>
             <a:r>
-              <a:rPr lang="en-US" altLang="ko-KR" b="0">
+              <a:rPr lang="en-US" altLang="ko-KR" b="0" dirty="0" err="1">
                 <a:solidFill>
                   <a:srgbClr val="3B3B3B"/>
                 </a:solidFill>
@@ -15795,7 +16127,7 @@
               <a:t>.</a:t>
             </a:r>
             <a:r>
-              <a:rPr lang="en-US" altLang="ko-KR" b="0">
+              <a:rPr lang="en-US" altLang="ko-KR" b="0" dirty="0" err="1">
                 <a:solidFill>
                   <a:srgbClr val="795E26"/>
                 </a:solidFill>
@@ -15805,7 +16137,7 @@
               <a:t>querySelector</a:t>
             </a:r>
             <a:r>
-              <a:rPr lang="en-US" altLang="ko-KR" b="0">
+              <a:rPr lang="en-US" altLang="ko-KR" b="0" dirty="0">
                 <a:solidFill>
                   <a:srgbClr val="3B3B3B"/>
                 </a:solidFill>
@@ -15815,137 +16147,157 @@
               <a:t>(</a:t>
             </a:r>
             <a:r>
-              <a:rPr lang="en-US" altLang="ko-KR" b="0">
+              <a:rPr lang="en-US" altLang="ko-KR" b="0" dirty="0">
                 <a:solidFill>
                   <a:srgbClr val="A31515"/>
                 </a:solidFill>
                 <a:effectLst/>
                 <a:latin typeface="Consolas" panose="020B0609020204030204" pitchFamily="49" charset="0"/>
               </a:rPr>
-              <a:t>'#purchases &gt; li:nth-child(2)'</a:t>
-            </a:r>
-            <a:r>
-              <a:rPr lang="en-US" altLang="ko-KR" b="0">
-                <a:solidFill>
-                  <a:srgbClr val="3B3B3B"/>
+              <a:t>'#purchases &gt; </a:t>
+            </a:r>
+            <a:r>
+              <a:rPr lang="en-US" altLang="ko-KR" b="0" dirty="0" err="1">
+                <a:solidFill>
+                  <a:srgbClr val="A31515"/>
                 </a:solidFill>
                 <a:effectLst/>
                 <a:latin typeface="Consolas" panose="020B0609020204030204" pitchFamily="49" charset="0"/>
               </a:rPr>
-              <a:t>);</a:t>
-            </a:r>
-          </a:p>
-          <a:p>
-            <a:r>
-              <a:rPr lang="en-US" altLang="ko-KR" b="0">
-                <a:solidFill>
-                  <a:srgbClr val="001080"/>
+              <a:t>li:nth-child</a:t>
+            </a:r>
+            <a:r>
+              <a:rPr lang="en-US" altLang="ko-KR" b="0" dirty="0">
+                <a:solidFill>
+                  <a:srgbClr val="A31515"/>
                 </a:solidFill>
                 <a:effectLst/>
                 <a:latin typeface="Consolas" panose="020B0609020204030204" pitchFamily="49" charset="0"/>
               </a:rPr>
-              <a:t>console</a:t>
-            </a:r>
-            <a:r>
-              <a:rPr lang="en-US" altLang="ko-KR" b="0">
+              <a:t>(2)'</a:t>
+            </a:r>
+            <a:r>
+              <a:rPr lang="en-US" altLang="ko-KR" b="0" dirty="0">
                 <a:solidFill>
                   <a:srgbClr val="3B3B3B"/>
                 </a:solidFill>
                 <a:effectLst/>
                 <a:latin typeface="Consolas" panose="020B0609020204030204" pitchFamily="49" charset="0"/>
               </a:rPr>
-              <a:t>.</a:t>
-            </a:r>
-            <a:r>
-              <a:rPr lang="en-US" altLang="ko-KR" b="0">
-                <a:solidFill>
-                  <a:srgbClr val="795E26"/>
+              <a:t>);</a:t>
+            </a:r>
+          </a:p>
+          <a:p>
+            <a:r>
+              <a:rPr lang="en-US" altLang="ko-KR" b="0" dirty="0">
+                <a:solidFill>
+                  <a:srgbClr val="001080"/>
                 </a:solidFill>
                 <a:effectLst/>
                 <a:latin typeface="Consolas" panose="020B0609020204030204" pitchFamily="49" charset="0"/>
               </a:rPr>
-              <a:t>log</a:t>
-            </a:r>
-            <a:r>
-              <a:rPr lang="en-US" altLang="ko-KR" b="0">
+              <a:t>console</a:t>
+            </a:r>
+            <a:r>
+              <a:rPr lang="en-US" altLang="ko-KR" b="0" dirty="0">
                 <a:solidFill>
                   <a:srgbClr val="3B3B3B"/>
                 </a:solidFill>
                 <a:effectLst/>
                 <a:latin typeface="Consolas" panose="020B0609020204030204" pitchFamily="49" charset="0"/>
               </a:rPr>
-              <a:t>(</a:t>
-            </a:r>
-            <a:r>
-              <a:rPr lang="en-US" altLang="ko-KR" b="0">
-                <a:solidFill>
-                  <a:srgbClr val="0070C1"/>
+              <a:t>.</a:t>
+            </a:r>
+            <a:r>
+              <a:rPr lang="en-US" altLang="ko-KR" b="0" dirty="0">
+                <a:solidFill>
+                  <a:srgbClr val="795E26"/>
                 </a:solidFill>
                 <a:effectLst/>
                 <a:latin typeface="Consolas" panose="020B0609020204030204" pitchFamily="49" charset="0"/>
               </a:rPr>
-              <a:t>secondLi</a:t>
-            </a:r>
-            <a:r>
-              <a:rPr lang="en-US" altLang="ko-KR" b="0">
+              <a:t>log</a:t>
+            </a:r>
+            <a:r>
+              <a:rPr lang="en-US" altLang="ko-KR" b="0" dirty="0">
                 <a:solidFill>
                   <a:srgbClr val="3B3B3B"/>
                 </a:solidFill>
                 <a:effectLst/>
                 <a:latin typeface="Consolas" panose="020B0609020204030204" pitchFamily="49" charset="0"/>
               </a:rPr>
-              <a:t>.</a:t>
-            </a:r>
-            <a:r>
-              <a:rPr lang="en-US" altLang="ko-KR">
-                <a:solidFill>
-                  <a:srgbClr val="001080"/>
-                </a:solidFill>
-                <a:latin typeface="Consolas" panose="020B0609020204030204" pitchFamily="49" charset="0"/>
-              </a:rPr>
-              <a:t>textContent</a:t>
-            </a:r>
-            <a:r>
-              <a:rPr lang="en-US" altLang="ko-KR" b="0">
-                <a:solidFill>
-                  <a:srgbClr val="3B3B3B"/>
+              <a:t>(</a:t>
+            </a:r>
+            <a:r>
+              <a:rPr lang="en-US" altLang="ko-KR" b="0" dirty="0" err="1">
+                <a:solidFill>
+                  <a:srgbClr val="0070C1"/>
                 </a:solidFill>
                 <a:effectLst/>
                 <a:latin typeface="Consolas" panose="020B0609020204030204" pitchFamily="49" charset="0"/>
               </a:rPr>
-              <a:t>);</a:t>
-            </a:r>
-            <a:r>
-              <a:rPr lang="ko-KR" altLang="en-US" b="0">
+              <a:t>secondLi</a:t>
+            </a:r>
+            <a:r>
+              <a:rPr lang="en-US" altLang="ko-KR" b="0" dirty="0" err="1">
                 <a:solidFill>
                   <a:srgbClr val="3B3B3B"/>
                 </a:solidFill>
                 <a:effectLst/>
                 <a:latin typeface="Consolas" panose="020B0609020204030204" pitchFamily="49" charset="0"/>
               </a:rPr>
-              <a:t> </a:t>
-            </a:r>
-            <a:r>
-              <a:rPr lang="en-US" altLang="ko-KR" b="0">
-                <a:solidFill>
-                  <a:srgbClr val="008000"/>
+              <a:t>.</a:t>
+            </a:r>
+            <a:r>
+              <a:rPr lang="en-US" altLang="ko-KR" dirty="0" err="1">
+                <a:solidFill>
+                  <a:srgbClr val="001080"/>
+                </a:solidFill>
+                <a:latin typeface="Consolas" panose="020B0609020204030204" pitchFamily="49" charset="0"/>
+              </a:rPr>
+              <a:t>textContent</a:t>
+            </a:r>
+            <a:r>
+              <a:rPr lang="en-US" altLang="ko-KR" b="0" dirty="0">
+                <a:solidFill>
+                  <a:srgbClr val="3B3B3B"/>
                 </a:solidFill>
                 <a:effectLst/>
                 <a:latin typeface="Consolas" panose="020B0609020204030204" pitchFamily="49" charset="0"/>
               </a:rPr>
-              <a:t>// </a:t>
-            </a:r>
-            <a:r>
-              <a:rPr lang="ko-KR" altLang="en-US" b="0">
-                <a:solidFill>
-                  <a:srgbClr val="008000"/>
+              <a:t>);</a:t>
+            </a:r>
+            <a:r>
+              <a:rPr lang="ko-KR" altLang="en-US" b="0" dirty="0">
+                <a:solidFill>
+                  <a:srgbClr val="3B3B3B"/>
                 </a:solidFill>
                 <a:effectLst/>
                 <a:latin typeface="Consolas" panose="020B0609020204030204" pitchFamily="49" charset="0"/>
               </a:rPr>
+              <a:t> </a:t>
+            </a:r>
+            <a:r>
+              <a:rPr lang="en-US" altLang="ko-KR" b="0" dirty="0">
+                <a:solidFill>
+                  <a:srgbClr val="008000"/>
+                </a:solidFill>
+                <a:effectLst/>
+                <a:latin typeface="Consolas" panose="020B0609020204030204" pitchFamily="49" charset="0"/>
+              </a:rPr>
+              <a:t>// </a:t>
+            </a:r>
+            <a:r>
+              <a:rPr lang="ko-KR" altLang="en-US" b="0" dirty="0">
+                <a:solidFill>
+                  <a:srgbClr val="008000"/>
+                </a:solidFill>
+                <a:effectLst/>
+                <a:latin typeface="Consolas" panose="020B0609020204030204" pitchFamily="49" charset="0"/>
+              </a:rPr>
               <a:t>계란️✔️</a:t>
             </a:r>
-            <a:endParaRPr lang="ko-KR" altLang="en-US" b="0">
+            <a:endParaRPr lang="ko-KR" altLang="en-US" b="0" dirty="0">
               <a:solidFill>
                 <a:srgbClr val="3B3B3B"/>
               </a:solidFill>
@@ -15989,7 +16341,7 @@
           <a:lstStyle/>
           <a:p>
             <a:r>
-              <a:rPr lang="en-US" altLang="ko-KR" b="0">
+              <a:rPr lang="en-US" altLang="ko-KR" b="0" dirty="0">
                 <a:solidFill>
                   <a:srgbClr val="0000FF"/>
                 </a:solidFill>
@@ -15999,7 +16351,7 @@
               <a:t>const</a:t>
             </a:r>
             <a:r>
-              <a:rPr lang="en-US" altLang="ko-KR" b="0">
+              <a:rPr lang="en-US" altLang="ko-KR" b="0" dirty="0">
                 <a:solidFill>
                   <a:srgbClr val="3B3B3B"/>
                 </a:solidFill>
@@ -16009,7 +16361,7 @@
               <a:t> </a:t>
             </a:r>
             <a:r>
-              <a:rPr lang="en-US" altLang="ko-KR" b="0">
+              <a:rPr lang="en-US" altLang="ko-KR" b="0" dirty="0" err="1">
                 <a:solidFill>
                   <a:srgbClr val="0070C1"/>
                 </a:solidFill>
@@ -16019,7 +16371,7 @@
               <a:t>secondLi</a:t>
             </a:r>
             <a:r>
-              <a:rPr lang="en-US" altLang="ko-KR" b="0">
+              <a:rPr lang="en-US" altLang="ko-KR" b="0" dirty="0">
                 <a:solidFill>
                   <a:srgbClr val="3B3B3B"/>
                 </a:solidFill>
@@ -16029,7 +16381,7 @@
               <a:t> </a:t>
             </a:r>
             <a:r>
-              <a:rPr lang="en-US" altLang="ko-KR" b="0">
+              <a:rPr lang="en-US" altLang="ko-KR" b="0" dirty="0">
                 <a:solidFill>
                   <a:srgbClr val="000000"/>
                 </a:solidFill>
@@ -16039,7 +16391,7 @@
               <a:t>=</a:t>
             </a:r>
             <a:r>
-              <a:rPr lang="en-US" altLang="ko-KR" b="0">
+              <a:rPr lang="en-US" altLang="ko-KR" b="0" dirty="0">
                 <a:solidFill>
                   <a:srgbClr val="3B3B3B"/>
                 </a:solidFill>
@@ -16049,7 +16401,7 @@
               <a:t> </a:t>
             </a:r>
             <a:r>
-              <a:rPr lang="en-US" altLang="ko-KR" b="0">
+              <a:rPr lang="en-US" altLang="ko-KR" b="0" dirty="0" err="1">
                 <a:solidFill>
                   <a:srgbClr val="001080"/>
                 </a:solidFill>
@@ -16059,7 +16411,7 @@
               <a:t>document</a:t>
             </a:r>
             <a:r>
-              <a:rPr lang="en-US" altLang="ko-KR" b="0">
+              <a:rPr lang="en-US" altLang="ko-KR" b="0" dirty="0" err="1">
                 <a:solidFill>
                   <a:srgbClr val="3B3B3B"/>
                 </a:solidFill>
@@ -16069,7 +16421,7 @@
               <a:t>.</a:t>
             </a:r>
             <a:r>
-              <a:rPr lang="en-US" altLang="ko-KR" b="0">
+              <a:rPr lang="en-US" altLang="ko-KR" b="0" dirty="0" err="1">
                 <a:solidFill>
                   <a:srgbClr val="795E26"/>
                 </a:solidFill>
@@ -16079,7 +16431,7 @@
               <a:t>querySelector</a:t>
             </a:r>
             <a:r>
-              <a:rPr lang="en-US" altLang="ko-KR" b="0">
+              <a:rPr lang="en-US" altLang="ko-KR" b="0" dirty="0">
                 <a:solidFill>
                   <a:srgbClr val="3B3B3B"/>
                 </a:solidFill>
@@ -16089,138 +16441,158 @@
               <a:t>(</a:t>
             </a:r>
             <a:r>
-              <a:rPr lang="en-US" altLang="ko-KR" b="0">
+              <a:rPr lang="en-US" altLang="ko-KR" b="0" dirty="0">
                 <a:solidFill>
                   <a:srgbClr val="A31515"/>
                 </a:solidFill>
                 <a:effectLst/>
                 <a:latin typeface="Consolas" panose="020B0609020204030204" pitchFamily="49" charset="0"/>
               </a:rPr>
-              <a:t>'#purchases &gt; li:nth-child(2)'</a:t>
-            </a:r>
-            <a:r>
-              <a:rPr lang="en-US" altLang="ko-KR" b="0">
-                <a:solidFill>
-                  <a:srgbClr val="3B3B3B"/>
+              <a:t>'#purchases &gt; </a:t>
+            </a:r>
+            <a:r>
+              <a:rPr lang="en-US" altLang="ko-KR" b="0" dirty="0" err="1">
+                <a:solidFill>
+                  <a:srgbClr val="A31515"/>
                 </a:solidFill>
                 <a:effectLst/>
                 <a:latin typeface="Consolas" panose="020B0609020204030204" pitchFamily="49" charset="0"/>
               </a:rPr>
-              <a:t>);</a:t>
-            </a:r>
-          </a:p>
-          <a:p>
-            <a:r>
-              <a:rPr lang="en-US" altLang="ko-KR" b="0">
-                <a:solidFill>
-                  <a:srgbClr val="001080"/>
+              <a:t>li:nth-child</a:t>
+            </a:r>
+            <a:r>
+              <a:rPr lang="en-US" altLang="ko-KR" b="0" dirty="0">
+                <a:solidFill>
+                  <a:srgbClr val="A31515"/>
                 </a:solidFill>
                 <a:effectLst/>
                 <a:latin typeface="Consolas" panose="020B0609020204030204" pitchFamily="49" charset="0"/>
               </a:rPr>
-              <a:t>console</a:t>
-            </a:r>
-            <a:r>
-              <a:rPr lang="en-US" altLang="ko-KR" b="0">
+              <a:t>(2)'</a:t>
+            </a:r>
+            <a:r>
+              <a:rPr lang="en-US" altLang="ko-KR" b="0" dirty="0">
                 <a:solidFill>
                   <a:srgbClr val="3B3B3B"/>
                 </a:solidFill>
                 <a:effectLst/>
                 <a:latin typeface="Consolas" panose="020B0609020204030204" pitchFamily="49" charset="0"/>
               </a:rPr>
-              <a:t>.</a:t>
-            </a:r>
-            <a:r>
-              <a:rPr lang="en-US" altLang="ko-KR" b="0">
-                <a:solidFill>
-                  <a:srgbClr val="795E26"/>
+              <a:t>);</a:t>
+            </a:r>
+          </a:p>
+          <a:p>
+            <a:r>
+              <a:rPr lang="en-US" altLang="ko-KR" b="0" dirty="0">
+                <a:solidFill>
+                  <a:srgbClr val="001080"/>
                 </a:solidFill>
                 <a:effectLst/>
                 <a:latin typeface="Consolas" panose="020B0609020204030204" pitchFamily="49" charset="0"/>
               </a:rPr>
-              <a:t>log</a:t>
-            </a:r>
-            <a:r>
-              <a:rPr lang="en-US" altLang="ko-KR" b="0">
+              <a:t>console</a:t>
+            </a:r>
+            <a:r>
+              <a:rPr lang="en-US" altLang="ko-KR" b="0" dirty="0">
                 <a:solidFill>
                   <a:srgbClr val="3B3B3B"/>
                 </a:solidFill>
                 <a:effectLst/>
                 <a:latin typeface="Consolas" panose="020B0609020204030204" pitchFamily="49" charset="0"/>
               </a:rPr>
-              <a:t>(</a:t>
-            </a:r>
-            <a:r>
-              <a:rPr lang="en-US" altLang="ko-KR" b="0">
-                <a:solidFill>
-                  <a:srgbClr val="0070C1"/>
+              <a:t>.</a:t>
+            </a:r>
+            <a:r>
+              <a:rPr lang="en-US" altLang="ko-KR" b="0" dirty="0">
+                <a:solidFill>
+                  <a:srgbClr val="795E26"/>
                 </a:solidFill>
                 <a:effectLst/>
                 <a:latin typeface="Consolas" panose="020B0609020204030204" pitchFamily="49" charset="0"/>
               </a:rPr>
-              <a:t>secondLi</a:t>
-            </a:r>
-            <a:r>
-              <a:rPr lang="en-US" altLang="ko-KR" b="0">
+              <a:t>log</a:t>
+            </a:r>
+            <a:r>
+              <a:rPr lang="en-US" altLang="ko-KR" b="0" dirty="0">
                 <a:solidFill>
                   <a:srgbClr val="3B3B3B"/>
                 </a:solidFill>
                 <a:effectLst/>
                 <a:latin typeface="Consolas" panose="020B0609020204030204" pitchFamily="49" charset="0"/>
               </a:rPr>
-              <a:t>.</a:t>
-            </a:r>
-            <a:r>
-              <a:rPr lang="en-US" altLang="ko-KR" b="0">
-                <a:solidFill>
-                  <a:srgbClr val="001080"/>
+              <a:t>(</a:t>
+            </a:r>
+            <a:r>
+              <a:rPr lang="en-US" altLang="ko-KR" b="0" dirty="0" err="1">
+                <a:solidFill>
+                  <a:srgbClr val="0070C1"/>
                 </a:solidFill>
                 <a:effectLst/>
                 <a:latin typeface="Consolas" panose="020B0609020204030204" pitchFamily="49" charset="0"/>
               </a:rPr>
-              <a:t>innerText</a:t>
-            </a:r>
-            <a:r>
-              <a:rPr lang="en-US" altLang="ko-KR" b="0">
+              <a:t>secondLi</a:t>
+            </a:r>
+            <a:r>
+              <a:rPr lang="en-US" altLang="ko-KR" b="0" dirty="0" err="1">
                 <a:solidFill>
                   <a:srgbClr val="3B3B3B"/>
                 </a:solidFill>
                 <a:effectLst/>
                 <a:latin typeface="Consolas" panose="020B0609020204030204" pitchFamily="49" charset="0"/>
               </a:rPr>
-              <a:t>);</a:t>
-            </a:r>
-            <a:r>
-              <a:rPr lang="ko-KR" altLang="en-US" b="0">
-                <a:solidFill>
-                  <a:srgbClr val="3B3B3B"/>
+              <a:t>.</a:t>
+            </a:r>
+            <a:r>
+              <a:rPr lang="en-US" altLang="ko-KR" b="0" dirty="0" err="1">
+                <a:solidFill>
+                  <a:srgbClr val="001080"/>
                 </a:solidFill>
                 <a:effectLst/>
                 <a:latin typeface="Consolas" panose="020B0609020204030204" pitchFamily="49" charset="0"/>
               </a:rPr>
-              <a:t> </a:t>
-            </a:r>
-            <a:r>
-              <a:rPr lang="en-US" altLang="ko-KR" b="0">
-                <a:solidFill>
-                  <a:srgbClr val="008000"/>
+              <a:t>innerText</a:t>
+            </a:r>
+            <a:r>
+              <a:rPr lang="en-US" altLang="ko-KR" b="0" dirty="0">
+                <a:solidFill>
+                  <a:srgbClr val="3B3B3B"/>
                 </a:solidFill>
                 <a:effectLst/>
                 <a:latin typeface="Consolas" panose="020B0609020204030204" pitchFamily="49" charset="0"/>
               </a:rPr>
-              <a:t>// </a:t>
-            </a:r>
-            <a:r>
-              <a:rPr lang="ko-KR" altLang="en-US" b="0">
-                <a:solidFill>
-                  <a:srgbClr val="008000"/>
+              <a:t>);</a:t>
+            </a:r>
+            <a:r>
+              <a:rPr lang="ko-KR" altLang="en-US" b="0" dirty="0">
+                <a:solidFill>
+                  <a:srgbClr val="3B3B3B"/>
                 </a:solidFill>
                 <a:effectLst/>
                 <a:latin typeface="Consolas" panose="020B0609020204030204" pitchFamily="49" charset="0"/>
               </a:rPr>
+              <a:t> </a:t>
+            </a:r>
+            <a:r>
+              <a:rPr lang="en-US" altLang="ko-KR" b="0" dirty="0">
+                <a:solidFill>
+                  <a:srgbClr val="008000"/>
+                </a:solidFill>
+                <a:effectLst/>
+                <a:latin typeface="Consolas" panose="020B0609020204030204" pitchFamily="49" charset="0"/>
+              </a:rPr>
+              <a:t>// </a:t>
+            </a:r>
+            <a:r>
+              <a:rPr lang="ko-KR" altLang="en-US" b="0" dirty="0">
+                <a:solidFill>
+                  <a:srgbClr val="008000"/>
+                </a:solidFill>
+                <a:effectLst/>
+                <a:latin typeface="Consolas" panose="020B0609020204030204" pitchFamily="49" charset="0"/>
+              </a:rPr>
               <a:t>계란</a:t>
             </a:r>
-            <a:endParaRPr lang="en-US" altLang="ko-KR" b="0">
+            <a:endParaRPr lang="en-US" altLang="ko-KR" b="0" dirty="0">
               <a:solidFill>
                 <a:srgbClr val="3B3B3B"/>
               </a:solidFill>
@@ -17227,7 +17599,7 @@
                         <a:tabLst/>
                       </a:pPr>
                       <a:r>
-                        <a:rPr kumimoji="0" lang="ko-KR" altLang="en-US" sz="1600" b="0" i="0" u="none" strike="noStrike" cap="none" normalizeH="0" baseline="0">
+                        <a:rPr kumimoji="0" lang="ko-KR" altLang="en-US" sz="1600" b="0" i="0" u="none" strike="noStrike" cap="none" normalizeH="0" baseline="0" dirty="0">
                           <a:ln>
                             <a:noFill/>
                           </a:ln>
@@ -17239,7 +17611,37 @@
                           <a:ea typeface="맑은 고딕" pitchFamily="50" charset="-127"/>
                           <a:cs typeface="Times New Roman" pitchFamily="18" charset="0"/>
                         </a:rPr>
-                        <a:t>지정한 이름으로 속성노드 생성</a:t>
+                        <a:t>지정한 이름으로 </a:t>
+                      </a:r>
+                      <a:r>
+                        <a:rPr kumimoji="0" lang="ko-KR" altLang="en-US" sz="1600" b="0" i="0" u="none" strike="noStrike" cap="none" normalizeH="0" baseline="0" dirty="0" err="1">
+                          <a:ln>
+                            <a:noFill/>
+                          </a:ln>
+                          <a:solidFill>
+                            <a:schemeClr val="tx1"/>
+                          </a:solidFill>
+                          <a:effectLst/>
+                          <a:latin typeface="맑은 고딕" pitchFamily="50" charset="-127"/>
+                          <a:ea typeface="맑은 고딕" pitchFamily="50" charset="-127"/>
+                          <a:cs typeface="Times New Roman" pitchFamily="18" charset="0"/>
+                        </a:rPr>
+                        <a:t>속성노드</a:t>
+                      </a:r>
+                      <a:r>
+                        <a:rPr kumimoji="0" lang="ko-KR" altLang="en-US" sz="1600" b="0" i="0" u="none" strike="noStrike" cap="none" normalizeH="0" baseline="0" dirty="0">
+                          <a:ln>
+                            <a:noFill/>
+                          </a:ln>
+                          <a:solidFill>
+                            <a:schemeClr val="tx1"/>
+                          </a:solidFill>
+                          <a:effectLst/>
+                          <a:latin typeface="맑은 고딕" pitchFamily="50" charset="-127"/>
+                          <a:ea typeface="맑은 고딕" pitchFamily="50" charset="-127"/>
+                          <a:cs typeface="Times New Roman" pitchFamily="18" charset="0"/>
+                        </a:rPr>
+                        <a:t> 생성</a:t>
                       </a:r>
                     </a:p>
                   </a:txBody>
@@ -17333,7 +17735,7 @@
           <a:lstStyle/>
           <a:p>
             <a:r>
-              <a:rPr lang="en-US" altLang="ko-KR">
+              <a:rPr lang="en-US" altLang="ko-KR" dirty="0">
                 <a:solidFill>
                   <a:srgbClr val="0000FF"/>
                 </a:solidFill>
@@ -17342,97 +17744,177 @@
               <a:t>const</a:t>
             </a:r>
             <a:r>
-              <a:rPr lang="en-US" altLang="ko-KR" b="0">
+              <a:rPr lang="en-US" altLang="ko-KR" b="0" dirty="0">
                 <a:solidFill>
                   <a:srgbClr val="000000"/>
                 </a:solidFill>
                 <a:effectLst/>
                 <a:latin typeface="Consolas" panose="020B0609020204030204" pitchFamily="49" charset="0"/>
               </a:rPr>
-              <a:t> newLiNode = document.createElement(</a:t>
-            </a:r>
-            <a:r>
-              <a:rPr lang="en-US" altLang="ko-KR" b="0">
-                <a:solidFill>
-                  <a:srgbClr val="A31515"/>
+              <a:t> </a:t>
+            </a:r>
+            <a:r>
+              <a:rPr lang="en-US" altLang="ko-KR" b="0" dirty="0" err="1">
+                <a:solidFill>
+                  <a:srgbClr val="000000"/>
                 </a:solidFill>
                 <a:effectLst/>
                 <a:latin typeface="Consolas" panose="020B0609020204030204" pitchFamily="49" charset="0"/>
               </a:rPr>
-              <a:t>"li"</a:t>
-            </a:r>
-            <a:r>
-              <a:rPr lang="en-US" altLang="ko-KR" b="0">
+              <a:t>newLiNode</a:t>
+            </a:r>
+            <a:r>
+              <a:rPr lang="en-US" altLang="ko-KR" b="0" dirty="0">
                 <a:solidFill>
                   <a:srgbClr val="000000"/>
                 </a:solidFill>
                 <a:effectLst/>
                 <a:latin typeface="Consolas" panose="020B0609020204030204" pitchFamily="49" charset="0"/>
               </a:rPr>
-              <a:t>);</a:t>
-            </a:r>
-          </a:p>
-          <a:p>
-            <a:br>
-              <a:rPr lang="en-US" altLang="ko-KR" b="0">
+              <a:t> = </a:t>
+            </a:r>
+            <a:r>
+              <a:rPr lang="en-US" altLang="ko-KR" b="0" dirty="0" err="1">
                 <a:solidFill>
                   <a:srgbClr val="000000"/>
                 </a:solidFill>
                 <a:effectLst/>
                 <a:latin typeface="Consolas" panose="020B0609020204030204" pitchFamily="49" charset="0"/>
               </a:rPr>
-            </a:br>
-            <a:r>
-              <a:rPr lang="en-US" altLang="ko-KR">
-                <a:solidFill>
-                  <a:srgbClr val="0000FF"/>
-                </a:solidFill>
-                <a:latin typeface="Consolas" panose="020B0609020204030204" pitchFamily="49" charset="0"/>
-              </a:rPr>
-              <a:t>const</a:t>
-            </a:r>
-            <a:r>
-              <a:rPr lang="en-US" altLang="ko-KR" b="0">
+              <a:t>document.createElement</a:t>
+            </a:r>
+            <a:r>
+              <a:rPr lang="en-US" altLang="ko-KR" b="0" dirty="0">
                 <a:solidFill>
                   <a:srgbClr val="000000"/>
                 </a:solidFill>
                 <a:effectLst/>
                 <a:latin typeface="Consolas" panose="020B0609020204030204" pitchFamily="49" charset="0"/>
               </a:rPr>
-              <a:t> newTextNode = document.createTextNode(</a:t>
-            </a:r>
-            <a:r>
-              <a:rPr lang="en-US" altLang="ko-KR" b="0">
+              <a:t>(</a:t>
+            </a:r>
+            <a:r>
+              <a:rPr lang="en-US" altLang="ko-KR" b="0" dirty="0">
                 <a:solidFill>
                   <a:srgbClr val="A31515"/>
                 </a:solidFill>
                 <a:effectLst/>
                 <a:latin typeface="Consolas" panose="020B0609020204030204" pitchFamily="49" charset="0"/>
               </a:rPr>
-              <a:t>"</a:t>
-            </a:r>
-            <a:r>
-              <a:rPr lang="ko-KR" altLang="en-US" b="0">
-                <a:solidFill>
-                  <a:srgbClr val="A31515"/>
+              <a:t>"li"</a:t>
+            </a:r>
+            <a:r>
+              <a:rPr lang="en-US" altLang="ko-KR" b="0" dirty="0">
+                <a:solidFill>
+                  <a:srgbClr val="000000"/>
                 </a:solidFill>
                 <a:effectLst/>
                 <a:latin typeface="Consolas" panose="020B0609020204030204" pitchFamily="49" charset="0"/>
               </a:rPr>
-              <a:t>우유</a:t>
-            </a:r>
-            <a:r>
-              <a:rPr lang="en-US" altLang="ko-KR" b="0">
-                <a:solidFill>
-                  <a:srgbClr val="A31515"/>
+              <a:t>);</a:t>
+            </a:r>
+          </a:p>
+          <a:p>
+            <a:br>
+              <a:rPr lang="en-US" altLang="ko-KR" b="0" dirty="0">
+                <a:solidFill>
+                  <a:srgbClr val="000000"/>
                 </a:solidFill>
                 <a:effectLst/>
                 <a:latin typeface="Consolas" panose="020B0609020204030204" pitchFamily="49" charset="0"/>
               </a:rPr>
+            </a:br>
+            <a:r>
+              <a:rPr lang="en-US" altLang="ko-KR" dirty="0">
+                <a:solidFill>
+                  <a:srgbClr val="0000FF"/>
+                </a:solidFill>
+                <a:latin typeface="Consolas" panose="020B0609020204030204" pitchFamily="49" charset="0"/>
+              </a:rPr>
+              <a:t>const</a:t>
+            </a:r>
+            <a:r>
+              <a:rPr lang="en-US" altLang="ko-KR" b="0" dirty="0">
+                <a:solidFill>
+                  <a:srgbClr val="000000"/>
+                </a:solidFill>
+                <a:effectLst/>
+                <a:latin typeface="Consolas" panose="020B0609020204030204" pitchFamily="49" charset="0"/>
+              </a:rPr>
+              <a:t> </a:t>
+            </a:r>
+            <a:r>
+              <a:rPr lang="en-US" altLang="ko-KR" b="0" dirty="0" err="1">
+                <a:solidFill>
+                  <a:srgbClr val="000000"/>
+                </a:solidFill>
+                <a:effectLst/>
+                <a:latin typeface="Consolas" panose="020B0609020204030204" pitchFamily="49" charset="0"/>
+              </a:rPr>
+              <a:t>newTextNode</a:t>
+            </a:r>
+            <a:r>
+              <a:rPr lang="en-US" altLang="ko-KR" b="0" dirty="0">
+                <a:solidFill>
+                  <a:srgbClr val="000000"/>
+                </a:solidFill>
+                <a:effectLst/>
+                <a:latin typeface="Consolas" panose="020B0609020204030204" pitchFamily="49" charset="0"/>
+              </a:rPr>
+              <a:t> = </a:t>
+            </a:r>
+            <a:r>
+              <a:rPr lang="en-US" altLang="ko-KR" b="0" dirty="0" err="1">
+                <a:solidFill>
+                  <a:srgbClr val="000000"/>
+                </a:solidFill>
+                <a:effectLst/>
+                <a:latin typeface="Consolas" panose="020B0609020204030204" pitchFamily="49" charset="0"/>
+              </a:rPr>
+              <a:t>document.createTextNode</a:t>
+            </a:r>
+            <a:r>
+              <a:rPr lang="en-US" altLang="ko-KR" b="0" dirty="0">
+                <a:solidFill>
+                  <a:srgbClr val="000000"/>
+                </a:solidFill>
+                <a:effectLst/>
+                <a:latin typeface="Consolas" panose="020B0609020204030204" pitchFamily="49" charset="0"/>
+              </a:rPr>
+              <a:t>(</a:t>
+            </a:r>
+            <a:r>
+              <a:rPr lang="en-US" altLang="ko-KR" b="0" dirty="0">
+                <a:solidFill>
+                  <a:srgbClr val="A31515"/>
+                </a:solidFill>
+                <a:effectLst/>
+                <a:latin typeface="Consolas" panose="020B0609020204030204" pitchFamily="49" charset="0"/>
+              </a:rPr>
               <a:t>"</a:t>
             </a:r>
             <a:r>
-              <a:rPr lang="en-US" altLang="ko-KR" b="0">
+              <a:rPr lang="ko-KR" altLang="en-US" b="0" dirty="0">
+                <a:solidFill>
+                  <a:srgbClr val="A31515"/>
+                </a:solidFill>
+                <a:effectLst/>
+                <a:latin typeface="Consolas" panose="020B0609020204030204" pitchFamily="49" charset="0"/>
+              </a:rPr>
+              <a:t>우유</a:t>
+            </a:r>
+            <a:r>
+              <a:rPr lang="en-US" altLang="ko-KR" b="0" dirty="0">
+                <a:solidFill>
+                  <a:srgbClr val="A31515"/>
+                </a:solidFill>
+                <a:effectLst/>
+                <a:latin typeface="Consolas" panose="020B0609020204030204" pitchFamily="49" charset="0"/>
+              </a:rPr>
+              <a:t>"</a:t>
+            </a:r>
+            <a:r>
+              <a:rPr lang="en-US" altLang="ko-KR" b="0" dirty="0">
                 <a:solidFill>
                   <a:srgbClr val="000000"/>
                 </a:solidFill>
@@ -18018,7 +18500,7 @@
         </p:nvSpPr>
         <p:spPr bwMode="auto">
           <a:xfrm>
-            <a:off x="7669294" y="2065338"/>
+            <a:off x="7669294" y="2021921"/>
             <a:ext cx="762000" cy="381000"/>
           </a:xfrm>
           <a:prstGeom prst="rect">
@@ -18118,8 +18600,8 @@
         </p:nvCxnSpPr>
         <p:spPr bwMode="auto">
           <a:xfrm flipV="1">
-            <a:off x="8050294" y="2446338"/>
-            <a:ext cx="0" cy="169862"/>
+            <a:off x="8050294" y="2402921"/>
+            <a:ext cx="0" cy="213279"/>
           </a:xfrm>
           <a:prstGeom prst="straightConnector1">
             <a:avLst/>
@@ -20059,7 +20541,7 @@
         <p:spPr bwMode="auto">
           <a:xfrm>
             <a:off x="228600" y="1717675"/>
-            <a:ext cx="6781800" cy="366713"/>
+            <a:ext cx="6781800" cy="646331"/>
           </a:xfrm>
           <a:prstGeom prst="rect">
             <a:avLst/>
@@ -20085,7 +20567,7 @@
               <a:buChar char="☞"/>
             </a:pPr>
             <a:r>
-              <a:rPr lang="en-US" altLang="ko-KR">
+              <a:rPr lang="en-US" altLang="ko-KR" dirty="0">
                 <a:solidFill>
                   <a:srgbClr val="0000FF"/>
                 </a:solidFill>
@@ -20095,11 +20577,54 @@
               <a:t>const</a:t>
             </a:r>
             <a:r>
-              <a:rPr lang="en-US" altLang="ko-KR">
+              <a:rPr lang="en-US" altLang="ko-KR" dirty="0">
                 <a:latin typeface="Consolas" panose="020B0609020204030204" pitchFamily="49" charset="0"/>
                 <a:ea typeface="Noto Sans CJK KR Regular" panose="020B0500000000000000" pitchFamily="34" charset="-127"/>
               </a:rPr>
-              <a:t> newLiNode = document.createElement("li");</a:t>
+              <a:t> </a:t>
+            </a:r>
+            <a:r>
+              <a:rPr lang="en-US" altLang="ko-KR" dirty="0" err="1">
+                <a:latin typeface="Consolas" panose="020B0609020204030204" pitchFamily="49" charset="0"/>
+                <a:ea typeface="Noto Sans CJK KR Regular" panose="020B0500000000000000" pitchFamily="34" charset="-127"/>
+              </a:rPr>
+              <a:t>newLiNode</a:t>
+            </a:r>
+            <a:r>
+              <a:rPr lang="en-US" altLang="ko-KR" dirty="0">
+                <a:latin typeface="Consolas" panose="020B0609020204030204" pitchFamily="49" charset="0"/>
+                <a:ea typeface="Noto Sans CJK KR Regular" panose="020B0500000000000000" pitchFamily="34" charset="-127"/>
+              </a:rPr>
+              <a:t> = </a:t>
+            </a:r>
+            <a:r>
+              <a:rPr lang="en-US" altLang="ko-KR" dirty="0" err="1"/>
+              <a:t>document.createElement</a:t>
+            </a:r>
+            <a:r>
+              <a:rPr lang="en-US" altLang="ko-KR" dirty="0"/>
+              <a:t>("li");</a:t>
+            </a:r>
+            <a:r>
+              <a:rPr lang="en-US" altLang="ko-KR" dirty="0">
+                <a:latin typeface="Consolas" panose="020B0609020204030204" pitchFamily="49" charset="0"/>
+                <a:ea typeface="Noto Sans CJK KR Regular" panose="020B0500000000000000" pitchFamily="34" charset="-127"/>
+              </a:rPr>
+              <a:t> </a:t>
+            </a:r>
+            <a:r>
+              <a:rPr lang="en-US" altLang="ko-KR" dirty="0" err="1">
+                <a:latin typeface="Consolas" panose="020B0609020204030204" pitchFamily="49" charset="0"/>
+                <a:ea typeface="Noto Sans CJK KR Regular" panose="020B0500000000000000" pitchFamily="34" charset="-127"/>
+              </a:rPr>
+              <a:t>document.createElement</a:t>
+            </a:r>
+            <a:r>
+              <a:rPr lang="en-US" altLang="ko-KR" dirty="0">
+                <a:latin typeface="Consolas" panose="020B0609020204030204" pitchFamily="49" charset="0"/>
+                <a:ea typeface="Noto Sans CJK KR Regular" panose="020B0500000000000000" pitchFamily="34" charset="-127"/>
+              </a:rPr>
+              <a:t>("li");</a:t>
             </a:r>
           </a:p>
         </p:txBody>
@@ -20147,7 +20672,7 @@
               <a:buChar char="☞"/>
             </a:pPr>
             <a:r>
-              <a:rPr lang="en-US" altLang="ko-KR">
+              <a:rPr lang="en-US" altLang="ko-KR" dirty="0">
                 <a:solidFill>
                   <a:srgbClr val="0000FF"/>
                 </a:solidFill>
@@ -20157,7 +20682,7 @@
               <a:t>const</a:t>
             </a:r>
             <a:r>
-              <a:rPr lang="en-US" altLang="ko-KR">
+              <a:rPr lang="en-US" altLang="ko-KR" dirty="0">
                 <a:latin typeface="Consolas" panose="020B0609020204030204" pitchFamily="49" charset="0"/>
                 <a:ea typeface="Noto Sans CJK KR Regular" panose="020B0500000000000000" pitchFamily="34" charset="-127"/>
               </a:rPr>
@@ -20251,11 +20776,32 @@
               <a:buChar char="☞"/>
             </a:pPr>
             <a:r>
-              <a:rPr lang="en-US" altLang="ko-KR">
+              <a:rPr lang="en-US" altLang="ko-KR" dirty="0" err="1">
                 <a:latin typeface="Consolas" panose="020B0609020204030204" pitchFamily="49" charset="0"/>
                 <a:ea typeface="Noto Sans CJK KR Regular" panose="020B0500000000000000" pitchFamily="34" charset="-127"/>
               </a:rPr>
-              <a:t>newLiNode.appendChild(newTextNode);</a:t>
+              <a:t>newLiNode.appendChild</a:t>
+            </a:r>
+            <a:r>
+              <a:rPr lang="en-US" altLang="ko-KR" dirty="0">
+                <a:latin typeface="Consolas" panose="020B0609020204030204" pitchFamily="49" charset="0"/>
+                <a:ea typeface="Noto Sans CJK KR Regular" panose="020B0500000000000000" pitchFamily="34" charset="-127"/>
+              </a:rPr>
+              <a:t>(</a:t>
+            </a:r>
+            <a:r>
+              <a:rPr lang="en-US" altLang="ko-KR" dirty="0" err="1">
+                <a:latin typeface="Consolas" panose="020B0609020204030204" pitchFamily="49" charset="0"/>
+                <a:ea typeface="Noto Sans CJK KR Regular" panose="020B0500000000000000" pitchFamily="34" charset="-127"/>
+              </a:rPr>
+              <a:t>newTextNode</a:t>
+            </a:r>
+            <a:r>
+              <a:rPr lang="en-US" altLang="ko-KR" dirty="0">
+                <a:latin typeface="Consolas" panose="020B0609020204030204" pitchFamily="49" charset="0"/>
+                <a:ea typeface="Noto Sans CJK KR Regular" panose="020B0500000000000000" pitchFamily="34" charset="-127"/>
+              </a:rPr>
+              <a:t>);</a:t>
             </a:r>
           </a:p>
         </p:txBody>
@@ -20303,11 +20849,32 @@
               <a:buChar char="☞"/>
             </a:pPr>
             <a:r>
-              <a:rPr lang="en-US" altLang="ko-KR">
+              <a:rPr lang="en-US" altLang="ko-KR" dirty="0" err="1">
                 <a:latin typeface="Consolas" panose="020B0609020204030204" pitchFamily="49" charset="0"/>
                 <a:ea typeface="Noto Sans CJK KR Regular" panose="020B0500000000000000" pitchFamily="34" charset="-127"/>
               </a:rPr>
-              <a:t>purchases.appendChild(newLiNode);</a:t>
+              <a:t>purchases.appendChild</a:t>
+            </a:r>
+            <a:r>
+              <a:rPr lang="en-US" altLang="ko-KR" dirty="0">
+                <a:latin typeface="Consolas" panose="020B0609020204030204" pitchFamily="49" charset="0"/>
+                <a:ea typeface="Noto Sans CJK KR Regular" panose="020B0500000000000000" pitchFamily="34" charset="-127"/>
+              </a:rPr>
+              <a:t>(</a:t>
+            </a:r>
+            <a:r>
+              <a:rPr lang="en-US" altLang="ko-KR" dirty="0" err="1">
+                <a:latin typeface="Consolas" panose="020B0609020204030204" pitchFamily="49" charset="0"/>
+                <a:ea typeface="Noto Sans CJK KR Regular" panose="020B0500000000000000" pitchFamily="34" charset="-127"/>
+              </a:rPr>
+              <a:t>newLiNode</a:t>
+            </a:r>
+            <a:r>
+              <a:rPr lang="en-US" altLang="ko-KR" dirty="0">
+                <a:latin typeface="Consolas" panose="020B0609020204030204" pitchFamily="49" charset="0"/>
+                <a:ea typeface="Noto Sans CJK KR Regular" panose="020B0500000000000000" pitchFamily="34" charset="-127"/>
+              </a:rPr>
+              <a:t>);</a:t>
             </a:r>
           </a:p>
         </p:txBody>
@@ -21581,27 +22148,20 @@
               <a:buChar char="☞"/>
             </a:pPr>
             <a:r>
-              <a:rPr lang="en-US" altLang="ko-KR">
+              <a:rPr lang="en-US" altLang="ko-KR" dirty="0">
                 <a:solidFill>
                   <a:srgbClr val="0000FF"/>
                 </a:solidFill>
                 <a:latin typeface="Consolas" panose="020B0609020204030204" pitchFamily="49" charset="0"/>
               </a:rPr>
               <a:t>const</a:t>
-            </a:r>
-            <a:r>
-              <a:rPr lang="en-US" altLang="ko-KR">
-                <a:latin typeface="Consolas" panose="020B0609020204030204" pitchFamily="49" charset="0"/>
-                <a:ea typeface="맑은 고딕" pitchFamily="50" charset="-127"/>
-              </a:rPr>
-              <a:t> </a:t>
             </a:r>
             <a:r>
               <a:rPr lang="en-US" altLang="ko-KR" dirty="0">
                 <a:latin typeface="Consolas" panose="020B0609020204030204" pitchFamily="49" charset="0"/>
                 <a:ea typeface="맑은 고딕" pitchFamily="50" charset="-127"/>
               </a:rPr>
-              <a:t>purchases = </a:t>
+              <a:t> purchases = </a:t>
             </a:r>
             <a:r>
               <a:rPr lang="en-US" altLang="ko-KR" dirty="0" err="1">
@@ -21652,11 +22212,18 @@
               <a:t>, </a:t>
             </a:r>
             <a:r>
-              <a:rPr lang="en-US" altLang="ko-KR">
+              <a:rPr lang="en-US" altLang="ko-KR" dirty="0" err="1">
                 <a:latin typeface="Consolas" panose="020B0609020204030204" pitchFamily="49" charset="0"/>
                 <a:ea typeface="맑은 고딕" pitchFamily="50" charset="-127"/>
               </a:rPr>
-              <a:t>purchases.firstChild);</a:t>
+              <a:t>purchases.firstChild</a:t>
+            </a:r>
+            <a:r>
+              <a:rPr lang="en-US" altLang="ko-KR" dirty="0">
+                <a:latin typeface="Consolas" panose="020B0609020204030204" pitchFamily="49" charset="0"/>
+                <a:ea typeface="맑은 고딕" pitchFamily="50" charset="-127"/>
+              </a:rPr>
+              <a:t>);</a:t>
             </a:r>
           </a:p>
         </p:txBody>
@@ -24311,7 +24878,7 @@
               <a:buChar char="☞"/>
             </a:pPr>
             <a:r>
-              <a:rPr lang="en-US" altLang="ko-KR">
+              <a:rPr lang="en-US" altLang="ko-KR" dirty="0">
                 <a:solidFill>
                   <a:srgbClr val="0000FF"/>
                 </a:solidFill>
@@ -24320,11 +24887,25 @@
               <a:t>const</a:t>
             </a:r>
             <a:r>
-              <a:rPr lang="en-US" altLang="ko-KR">
+              <a:rPr lang="en-US" altLang="ko-KR" dirty="0">
                 <a:latin typeface="Consolas" panose="020B0609020204030204" pitchFamily="49" charset="0"/>
                 <a:ea typeface="맑은 고딕" pitchFamily="50" charset="-127"/>
               </a:rPr>
-              <a:t> purchases = document.getElementById("purchases");</a:t>
+              <a:t> purchases = </a:t>
+            </a:r>
+            <a:r>
+              <a:rPr lang="en-US" altLang="ko-KR" dirty="0" err="1">
+                <a:latin typeface="Consolas" panose="020B0609020204030204" pitchFamily="49" charset="0"/>
+                <a:ea typeface="맑은 고딕" pitchFamily="50" charset="-127"/>
+              </a:rPr>
+              <a:t>document.getElementById</a:t>
+            </a:r>
+            <a:r>
+              <a:rPr lang="en-US" altLang="ko-KR" dirty="0">
+                <a:latin typeface="Consolas" panose="020B0609020204030204" pitchFamily="49" charset="0"/>
+                <a:ea typeface="맑은 고딕" pitchFamily="50" charset="-127"/>
+              </a:rPr>
+              <a:t>("purchases");</a:t>
             </a:r>
           </a:p>
           <a:p>
@@ -24333,11 +24914,32 @@
               <a:buChar char="☞"/>
             </a:pPr>
             <a:r>
-              <a:rPr lang="en-US" altLang="ko-KR">
+              <a:rPr lang="en-US" altLang="ko-KR" dirty="0" err="1">
                 <a:latin typeface="Consolas" panose="020B0609020204030204" pitchFamily="49" charset="0"/>
                 <a:ea typeface="맑은 고딕" pitchFamily="50" charset="-127"/>
               </a:rPr>
-              <a:t>purchases.removeChild(purchases.firstChild);</a:t>
+              <a:t>purchases.removeChild</a:t>
+            </a:r>
+            <a:r>
+              <a:rPr lang="en-US" altLang="ko-KR" dirty="0">
+                <a:latin typeface="Consolas" panose="020B0609020204030204" pitchFamily="49" charset="0"/>
+                <a:ea typeface="맑은 고딕" pitchFamily="50" charset="-127"/>
+              </a:rPr>
+              <a:t>(</a:t>
+            </a:r>
+            <a:r>
+              <a:rPr lang="en-US" altLang="ko-KR" dirty="0" err="1">
+                <a:latin typeface="Consolas" panose="020B0609020204030204" pitchFamily="49" charset="0"/>
+                <a:ea typeface="맑은 고딕" pitchFamily="50" charset="-127"/>
+              </a:rPr>
+              <a:t>purchases.firstChild</a:t>
+            </a:r>
+            <a:r>
+              <a:rPr lang="en-US" altLang="ko-KR" dirty="0">
+                <a:latin typeface="Consolas" panose="020B0609020204030204" pitchFamily="49" charset="0"/>
+                <a:ea typeface="맑은 고딕" pitchFamily="50" charset="-127"/>
+              </a:rPr>
+              <a:t>);</a:t>
             </a:r>
           </a:p>
         </p:txBody>
@@ -27231,7 +27833,21 @@
                 <a:latin typeface="Noto Sans CJK KR Regular" panose="020B0500000000000000" pitchFamily="34" charset="-127"/>
                 <a:ea typeface="Noto Sans CJK KR Regular" panose="020B0500000000000000" pitchFamily="34" charset="-127"/>
               </a:rPr>
-              <a:t>false</a:t>
+              <a:t>false(</a:t>
+            </a:r>
+            <a:r>
+              <a:rPr lang="ko-KR" altLang="en-US" b="0" dirty="0">
+                <a:latin typeface="Noto Sans CJK KR Regular" panose="020B0500000000000000" pitchFamily="34" charset="-127"/>
+                <a:ea typeface="Noto Sans CJK KR Regular" panose="020B0500000000000000" pitchFamily="34" charset="-127"/>
+              </a:rPr>
+              <a:t>기본값</a:t>
+            </a:r>
+            <a:r>
+              <a:rPr lang="en-US" altLang="ko-KR" b="0" dirty="0">
+                <a:latin typeface="Noto Sans CJK KR Regular" panose="020B0500000000000000" pitchFamily="34" charset="-127"/>
+                <a:ea typeface="Noto Sans CJK KR Regular" panose="020B0500000000000000" pitchFamily="34" charset="-127"/>
+              </a:rPr>
+              <a:t>)</a:t>
             </a:r>
             <a:r>
               <a:rPr lang="ko-KR" altLang="en-US" b="0" dirty="0">
@@ -29398,8 +30014,8 @@
         </p:nvSpPr>
         <p:spPr bwMode="auto">
           <a:xfrm>
-            <a:off x="228600" y="2212975"/>
-            <a:ext cx="7823201" cy="923330"/>
+            <a:off x="228600" y="2097741"/>
+            <a:ext cx="7823201" cy="1200329"/>
           </a:xfrm>
           <a:prstGeom prst="rect">
             <a:avLst/>
@@ -29425,7 +30041,7 @@
               <a:buChar char="☞"/>
             </a:pPr>
             <a:r>
-              <a:rPr lang="en-US" altLang="ko-KR">
+              <a:rPr lang="en-US" altLang="ko-KR" dirty="0">
                 <a:solidFill>
                   <a:srgbClr val="0000FF"/>
                 </a:solidFill>
@@ -29434,11 +30050,25 @@
               <a:t>const</a:t>
             </a:r>
             <a:r>
-              <a:rPr lang="en-US" altLang="ko-KR">
+              <a:rPr lang="en-US" altLang="ko-KR" dirty="0">
                 <a:latin typeface="Consolas" panose="020B0609020204030204" pitchFamily="49" charset="0"/>
                 <a:ea typeface="맑은 고딕" pitchFamily="50" charset="-127"/>
               </a:rPr>
-              <a:t> purchases = document.getElementById("purchases");</a:t>
+              <a:t> purchases = </a:t>
+            </a:r>
+            <a:r>
+              <a:rPr lang="en-US" altLang="ko-KR" dirty="0" err="1">
+                <a:latin typeface="Consolas" panose="020B0609020204030204" pitchFamily="49" charset="0"/>
+                <a:ea typeface="맑은 고딕" pitchFamily="50" charset="-127"/>
+              </a:rPr>
+              <a:t>document.getElementById</a:t>
+            </a:r>
+            <a:r>
+              <a:rPr lang="en-US" altLang="ko-KR" dirty="0">
+                <a:latin typeface="Consolas" panose="020B0609020204030204" pitchFamily="49" charset="0"/>
+                <a:ea typeface="맑은 고딕" pitchFamily="50" charset="-127"/>
+              </a:rPr>
+              <a:t>("purchases");</a:t>
             </a:r>
           </a:p>
           <a:p>
@@ -29447,7 +30077,7 @@
               <a:buChar char="☞"/>
             </a:pPr>
             <a:r>
-              <a:rPr lang="en-US" altLang="ko-KR">
+              <a:rPr lang="en-US" altLang="ko-KR" dirty="0">
                 <a:solidFill>
                   <a:srgbClr val="0000FF"/>
                 </a:solidFill>
@@ -29456,11 +30086,39 @@
               <a:t>const</a:t>
             </a:r>
             <a:r>
-              <a:rPr lang="en-US" altLang="ko-KR">
+              <a:rPr lang="en-US" altLang="ko-KR" dirty="0">
                 <a:latin typeface="Consolas" panose="020B0609020204030204" pitchFamily="49" charset="0"/>
                 <a:ea typeface="맑은 고딕" pitchFamily="50" charset="-127"/>
               </a:rPr>
-              <a:t> cloneLi = purchases.firstChild.cloneNode(true);</a:t>
+              <a:t> </a:t>
+            </a:r>
+            <a:r>
+              <a:rPr lang="en-US" altLang="ko-KR" dirty="0" err="1">
+                <a:latin typeface="Consolas" panose="020B0609020204030204" pitchFamily="49" charset="0"/>
+                <a:ea typeface="맑은 고딕" pitchFamily="50" charset="-127"/>
+              </a:rPr>
+              <a:t>cloneLi</a:t>
+            </a:r>
+            <a:r>
+              <a:rPr lang="en-US" altLang="ko-KR" dirty="0">
+                <a:latin typeface="Consolas" panose="020B0609020204030204" pitchFamily="49" charset="0"/>
+                <a:ea typeface="맑은 고딕" pitchFamily="50" charset="-127"/>
+              </a:rPr>
+              <a:t> = </a:t>
+            </a:r>
+            <a:r>
+              <a:rPr lang="en-US" altLang="ko-KR" dirty="0" err="1">
+                <a:latin typeface="Consolas" panose="020B0609020204030204" pitchFamily="49" charset="0"/>
+                <a:ea typeface="맑은 고딕" pitchFamily="50" charset="-127"/>
+              </a:rPr>
+              <a:t>purchases.firstChild.cloneNode</a:t>
+            </a:r>
+            <a:r>
+              <a:rPr lang="en-US" altLang="ko-KR" dirty="0">
+                <a:latin typeface="Consolas" panose="020B0609020204030204" pitchFamily="49" charset="0"/>
+                <a:ea typeface="맑은 고딕" pitchFamily="50" charset="-127"/>
+              </a:rPr>
+              <a:t>(true);</a:t>
             </a:r>
           </a:p>
           <a:p>
@@ -29469,11 +30127,32 @@
               <a:buChar char="☞"/>
             </a:pPr>
             <a:r>
-              <a:rPr lang="en-US" altLang="ko-KR">
+              <a:rPr lang="en-US" altLang="ko-KR" dirty="0" err="1">
                 <a:latin typeface="Consolas" panose="020B0609020204030204" pitchFamily="49" charset="0"/>
                 <a:ea typeface="맑은 고딕" pitchFamily="50" charset="-127"/>
               </a:rPr>
-              <a:t>purchases.appendChild(cloneLi);</a:t>
+              <a:t>purchases.appendChild</a:t>
+            </a:r>
+            <a:r>
+              <a:rPr lang="en-US" altLang="ko-KR" dirty="0">
+                <a:latin typeface="Consolas" panose="020B0609020204030204" pitchFamily="49" charset="0"/>
+                <a:ea typeface="맑은 고딕" pitchFamily="50" charset="-127"/>
+              </a:rPr>
+              <a:t>(</a:t>
+            </a:r>
+            <a:r>
+              <a:rPr lang="en-US" altLang="ko-KR" dirty="0" err="1">
+                <a:latin typeface="Consolas" panose="020B0609020204030204" pitchFamily="49" charset="0"/>
+                <a:ea typeface="맑은 고딕" pitchFamily="50" charset="-127"/>
+              </a:rPr>
+              <a:t>cloneLi</a:t>
+            </a:r>
+            <a:r>
+              <a:rPr lang="en-US" altLang="ko-KR" dirty="0">
+                <a:latin typeface="Consolas" panose="020B0609020204030204" pitchFamily="49" charset="0"/>
+                <a:ea typeface="맑은 고딕" pitchFamily="50" charset="-127"/>
+              </a:rPr>
+              <a:t>)</a:t>
             </a:r>
           </a:p>
         </p:txBody>

</xml_diff>